<commit_message>
css and slide changes
</commit_message>
<xml_diff>
--- a/SPSChicagoBurbs.pptx
+++ b/SPSChicagoBurbs.pptx
@@ -9127,7 +9127,7 @@
           <a:pPr rtl="0"/>
           <a:r>
             <a:rPr lang="en-US" sz="2800" dirty="0" smtClean="0"/>
-            <a:t>Show practical examples of CSR to customize forms and Views</a:t>
+            <a:t>Show practical examples of CSR to customize forms (and possibly Views)</a:t>
           </a:r>
           <a:endParaRPr lang="en-US" sz="2800" dirty="0"/>
         </a:p>
@@ -9404,10 +9404,9 @@
       <dgm:prSet presAssocID="{EF8BB5DB-ED8F-478B-950C-6AA0076EDED0}" presName="diamond" presStyleLbl="bgShp" presStyleIdx="0" presStyleCnt="1" custScaleX="238012"/>
       <dgm:spPr>
         <a:solidFill>
-          <a:schemeClr val="accent5">
-            <a:lumMod val="40000"/>
-            <a:lumOff val="60000"/>
-          </a:schemeClr>
+          <a:srgbClr val="ECECEC">
+            <a:alpha val="0"/>
+          </a:srgbClr>
         </a:solidFill>
       </dgm:spPr>
       <dgm:t>
@@ -9577,10 +9576,10 @@
         <a:p>
           <a:pPr rtl="0"/>
           <a:r>
-            <a:rPr lang="en-US" smtClean="0"/>
+            <a:rPr lang="en-US" dirty="0" smtClean="0"/>
             <a:t>It seems like the right granularity, if you want to modify a field, modify it’s JSLink and you’ve modified it everywhere</a:t>
           </a:r>
-          <a:endParaRPr lang="en-US"/>
+          <a:endParaRPr lang="en-US" dirty="0"/>
         </a:p>
       </dgm:t>
     </dgm:pt>
@@ -9615,10 +9614,10 @@
         <a:p>
           <a:pPr rtl="0"/>
           <a:r>
-            <a:rPr lang="en-US" smtClean="0"/>
+            <a:rPr lang="en-US" dirty="0" smtClean="0"/>
             <a:t>If you apply the same JS file as JSLink on two different fields, SharePoint is smart enough to only load it once</a:t>
           </a:r>
-          <a:endParaRPr lang="en-US"/>
+          <a:endParaRPr lang="en-US" dirty="0"/>
         </a:p>
       </dgm:t>
     </dgm:pt>
@@ -9691,10 +9690,10 @@
         <a:p>
           <a:pPr rtl="0"/>
           <a:r>
-            <a:rPr lang="en-US" smtClean="0"/>
+            <a:rPr lang="en-US" dirty="0" smtClean="0"/>
             <a:t>Some column types have a read-only JSLink property</a:t>
           </a:r>
-          <a:endParaRPr lang="en-US"/>
+          <a:endParaRPr lang="en-US" dirty="0"/>
         </a:p>
       </dgm:t>
     </dgm:pt>
@@ -9729,10 +9728,10 @@
         <a:p>
           <a:pPr rtl="0"/>
           <a:r>
-            <a:rPr lang="en-US" smtClean="0"/>
+            <a:rPr lang="en-US" dirty="0" smtClean="0"/>
             <a:t>The fact that JSLink is not supported doesn’t necessarily mean that CSR is not supported</a:t>
           </a:r>
-          <a:endParaRPr lang="en-US"/>
+          <a:endParaRPr lang="en-US" dirty="0"/>
         </a:p>
       </dgm:t>
     </dgm:pt>
@@ -9767,10 +9766,10 @@
         <a:p>
           <a:pPr rtl="0"/>
           <a:r>
-            <a:rPr lang="en-US" smtClean="0"/>
+            <a:rPr lang="en-US" dirty="0" smtClean="0"/>
             <a:t>It can be difficult to manage if you have a lot of columns with a lot of templates applies through JSLink, a well thought out utility page could help overcome this</a:t>
           </a:r>
-          <a:endParaRPr lang="en-US"/>
+          <a:endParaRPr lang="en-US" dirty="0"/>
         </a:p>
       </dgm:t>
     </dgm:pt>
@@ -9929,10 +9928,10 @@
         <a:p>
           <a:pPr rtl="0"/>
           <a:r>
-            <a:rPr lang="en-US" smtClean="0"/>
+            <a:rPr lang="en-US" dirty="0" smtClean="0"/>
             <a:t>Pros</a:t>
           </a:r>
-          <a:endParaRPr lang="en-US"/>
+          <a:endParaRPr lang="en-US" dirty="0"/>
         </a:p>
       </dgm:t>
     </dgm:pt>
@@ -10005,10 +10004,10 @@
         <a:p>
           <a:pPr rtl="0"/>
           <a:r>
-            <a:rPr lang="en-US" smtClean="0"/>
+            <a:rPr lang="en-US" dirty="0" smtClean="0"/>
             <a:t>Cons</a:t>
           </a:r>
-          <a:endParaRPr lang="en-US"/>
+          <a:endParaRPr lang="en-US" dirty="0"/>
         </a:p>
       </dgm:t>
     </dgm:pt>
@@ -10043,10 +10042,10 @@
         <a:p>
           <a:pPr rtl="0"/>
           <a:r>
-            <a:rPr lang="en-US" smtClean="0"/>
+            <a:rPr lang="en-US" dirty="0" smtClean="0"/>
             <a:t>You need to make your code bullet-proof enough to run everywhere</a:t>
           </a:r>
-          <a:endParaRPr lang="en-US"/>
+          <a:endParaRPr lang="en-US" dirty="0"/>
         </a:p>
       </dgm:t>
     </dgm:pt>
@@ -10081,10 +10080,10 @@
         <a:p>
           <a:pPr rtl="0"/>
           <a:r>
-            <a:rPr lang="en-US" smtClean="0"/>
+            <a:rPr lang="en-US" dirty="0" smtClean="0"/>
             <a:t>i.e. Site Settings -&gt; Solutions -&gt; Add Solution dialog loads your code; guess what…SPClientTemplates isn’t loaded</a:t>
           </a:r>
-          <a:endParaRPr lang="en-US"/>
+          <a:endParaRPr lang="en-US" dirty="0"/>
         </a:p>
       </dgm:t>
     </dgm:pt>
@@ -10279,10 +10278,10 @@
         <a:p>
           <a:pPr rtl="0"/>
           <a:r>
-            <a:rPr lang="en-US" smtClean="0"/>
+            <a:rPr lang="en-US" dirty="0" smtClean="0"/>
             <a:t>Pros</a:t>
           </a:r>
-          <a:endParaRPr lang="en-US"/>
+          <a:endParaRPr lang="en-US" dirty="0"/>
         </a:p>
       </dgm:t>
     </dgm:pt>
@@ -10393,10 +10392,10 @@
         <a:p>
           <a:pPr rtl="0"/>
           <a:r>
-            <a:rPr lang="en-US" smtClean="0"/>
+            <a:rPr lang="en-US" dirty="0" smtClean="0"/>
             <a:t>Cons</a:t>
           </a:r>
-          <a:endParaRPr lang="en-US"/>
+          <a:endParaRPr lang="en-US" dirty="0"/>
         </a:p>
       </dgm:t>
     </dgm:pt>
@@ -10432,15 +10431,7 @@
           <a:pPr rtl="0"/>
           <a:r>
             <a:rPr lang="en-US" sz="2800" dirty="0" smtClean="0"/>
-            <a:t>I got </a:t>
-          </a:r>
-          <a:r>
-            <a:rPr lang="en-US" sz="2800" dirty="0" err="1" smtClean="0"/>
-            <a:t>nothin</a:t>
-          </a:r>
-          <a:r>
-            <a:rPr lang="en-US" sz="2800" dirty="0" smtClean="0"/>
-            <a:t>’, this is pure goodness</a:t>
+            <a:t>I got nothin’, this is pure goodness</a:t>
           </a:r>
           <a:endParaRPr lang="en-US" sz="2800" dirty="0"/>
         </a:p>
@@ -12040,11 +12031,15 @@
           </a:r>
           <a:r>
             <a:rPr lang="en-US" sz="2000" dirty="0" smtClean="0"/>
-            <a:t>- Form, Field, Content Type, View, List View Web Part (XLSTListViewWebPart</a:t>
+            <a:t>- Form, Field, Content Type, View, List View Web Part </a:t>
           </a:r>
           <a:r>
-            <a:rPr lang="en-US" sz="500" dirty="0" smtClean="0"/>
-            <a:t>)</a:t>
+            <a:rPr lang="en-US" sz="2000" smtClean="0"/>
+            <a:t>(</a:t>
+          </a:r>
+          <a:r>
+            <a:rPr lang="en-US" sz="2000" smtClean="0"/>
+            <a:t>XLSTListViewWebPart)</a:t>
           </a:r>
           <a:endParaRPr lang="en-US" sz="500" dirty="0"/>
         </a:p>
@@ -12805,10 +12800,10 @@
         <a:p>
           <a:pPr rtl="0"/>
           <a:r>
-            <a:rPr lang="en-US" smtClean="0"/>
+            <a:rPr lang="en-US" dirty="0" smtClean="0"/>
             <a:t>Pros</a:t>
           </a:r>
-          <a:endParaRPr lang="en-US"/>
+          <a:endParaRPr lang="en-US" dirty="0"/>
         </a:p>
       </dgm:t>
     </dgm:pt>
@@ -12843,10 +12838,10 @@
         <a:p>
           <a:pPr rtl="0"/>
           <a:r>
-            <a:rPr lang="en-US" smtClean="0"/>
+            <a:rPr lang="en-US" dirty="0" smtClean="0"/>
             <a:t>Very easy.</a:t>
           </a:r>
-          <a:endParaRPr lang="en-US"/>
+          <a:endParaRPr lang="en-US" dirty="0"/>
         </a:p>
       </dgm:t>
     </dgm:pt>
@@ -12881,10 +12876,10 @@
         <a:p>
           <a:pPr rtl="0"/>
           <a:r>
-            <a:rPr lang="en-US" smtClean="0"/>
+            <a:rPr lang="en-US" dirty="0" smtClean="0"/>
             <a:t>Doesn’t require any additional code or packaging (i.e. it can be done OOB by a non-developer)</a:t>
           </a:r>
-          <a:endParaRPr lang="en-US"/>
+          <a:endParaRPr lang="en-US" dirty="0"/>
         </a:p>
       </dgm:t>
     </dgm:pt>
@@ -12919,10 +12914,10 @@
         <a:p>
           <a:pPr rtl="0"/>
           <a:r>
-            <a:rPr lang="en-US" smtClean="0"/>
+            <a:rPr lang="en-US" dirty="0" smtClean="0"/>
             <a:t>Cons</a:t>
           </a:r>
-          <a:endParaRPr lang="en-US"/>
+          <a:endParaRPr lang="en-US" dirty="0"/>
         </a:p>
       </dgm:t>
     </dgm:pt>
@@ -12957,10 +12952,10 @@
         <a:p>
           <a:pPr rtl="0"/>
           <a:r>
-            <a:rPr lang="en-US" smtClean="0"/>
+            <a:rPr lang="en-US" dirty="0" smtClean="0"/>
             <a:t>It’s really a one-off solution (i.e. not enterprise)</a:t>
           </a:r>
-          <a:endParaRPr lang="en-US"/>
+          <a:endParaRPr lang="en-US" dirty="0"/>
         </a:p>
       </dgm:t>
     </dgm:pt>
@@ -12995,10 +12990,10 @@
         <a:p>
           <a:pPr rtl="0"/>
           <a:r>
-            <a:rPr lang="en-US" smtClean="0"/>
+            <a:rPr lang="en-US" dirty="0" smtClean="0"/>
             <a:t>Needs to be applied separately to the new, edit, and display forms</a:t>
           </a:r>
-          <a:endParaRPr lang="en-US"/>
+          <a:endParaRPr lang="en-US" dirty="0"/>
         </a:p>
       </dgm:t>
     </dgm:pt>
@@ -13033,10 +13028,10 @@
         <a:p>
           <a:pPr rtl="0"/>
           <a:r>
-            <a:rPr lang="en-US" smtClean="0"/>
+            <a:rPr lang="en-US" dirty="0" smtClean="0"/>
             <a:t>Needs to be applied separately to each view in which your field is displayed (or might be displayed)</a:t>
           </a:r>
-          <a:endParaRPr lang="en-US"/>
+          <a:endParaRPr lang="en-US" dirty="0"/>
         </a:p>
       </dgm:t>
     </dgm:pt>
@@ -13071,10 +13066,10 @@
         <a:p>
           <a:pPr rtl="0"/>
           <a:r>
-            <a:rPr lang="en-US" smtClean="0"/>
+            <a:rPr lang="en-US" dirty="0" smtClean="0"/>
             <a:t>If somebody adds a view later, or modifies a view later, it may need to be applied again</a:t>
           </a:r>
-          <a:endParaRPr lang="en-US"/>
+          <a:endParaRPr lang="en-US" dirty="0"/>
         </a:p>
       </dgm:t>
     </dgm:pt>
@@ -13109,10 +13104,10 @@
         <a:p>
           <a:pPr rtl="0"/>
           <a:r>
-            <a:rPr lang="en-US" smtClean="0"/>
+            <a:rPr lang="en-US" dirty="0" smtClean="0"/>
             <a:t>If you want to use it in another list, start the whole process over again</a:t>
           </a:r>
-          <a:endParaRPr lang="en-US"/>
+          <a:endParaRPr lang="en-US" dirty="0"/>
         </a:p>
       </dgm:t>
     </dgm:pt>
@@ -13275,10 +13270,10 @@
         <a:p>
           <a:pPr rtl="0"/>
           <a:r>
-            <a:rPr lang="en-US" smtClean="0"/>
+            <a:rPr lang="en-US" dirty="0" smtClean="0"/>
             <a:t>Pros</a:t>
           </a:r>
-          <a:endParaRPr lang="en-US"/>
+          <a:endParaRPr lang="en-US" dirty="0"/>
         </a:p>
       </dgm:t>
     </dgm:pt>
@@ -13313,10 +13308,10 @@
         <a:p>
           <a:pPr rtl="0"/>
           <a:r>
-            <a:rPr lang="en-US" smtClean="0"/>
+            <a:rPr lang="en-US" dirty="0" smtClean="0"/>
             <a:t>Somewhat self documenting</a:t>
           </a:r>
-          <a:endParaRPr lang="en-US"/>
+          <a:endParaRPr lang="en-US" dirty="0"/>
         </a:p>
       </dgm:t>
     </dgm:pt>
@@ -13351,10 +13346,10 @@
         <a:p>
           <a:pPr rtl="0"/>
           <a:r>
-            <a:rPr lang="en-US" smtClean="0"/>
+            <a:rPr lang="en-US" dirty="0" smtClean="0"/>
             <a:t>Can be deployed by an admin through the browser</a:t>
           </a:r>
-          <a:endParaRPr lang="en-US"/>
+          <a:endParaRPr lang="en-US" dirty="0"/>
         </a:p>
       </dgm:t>
     </dgm:pt>
@@ -13389,10 +13384,10 @@
         <a:p>
           <a:pPr rtl="0"/>
           <a:r>
-            <a:rPr lang="en-US" smtClean="0"/>
+            <a:rPr lang="en-US" dirty="0" smtClean="0"/>
             <a:t>Cons</a:t>
           </a:r>
-          <a:endParaRPr lang="en-US"/>
+          <a:endParaRPr lang="en-US" dirty="0"/>
         </a:p>
       </dgm:t>
     </dgm:pt>
@@ -13427,10 +13422,10 @@
         <a:p>
           <a:pPr rtl="0"/>
           <a:r>
-            <a:rPr lang="en-US" smtClean="0"/>
+            <a:rPr lang="en-US" dirty="0" smtClean="0"/>
             <a:t>It is a messy solution (i.e. does not uninstall cleanly)</a:t>
           </a:r>
-          <a:endParaRPr lang="en-US"/>
+          <a:endParaRPr lang="en-US" dirty="0"/>
         </a:p>
       </dgm:t>
     </dgm:pt>
@@ -13465,10 +13460,10 @@
         <a:p>
           <a:pPr rtl="0"/>
           <a:r>
-            <a:rPr lang="en-US" smtClean="0"/>
+            <a:rPr lang="en-US" dirty="0" smtClean="0"/>
             <a:t>It leaves behind any instances like site columns</a:t>
           </a:r>
-          <a:endParaRPr lang="en-US"/>
+          <a:endParaRPr lang="en-US" dirty="0"/>
         </a:p>
       </dgm:t>
     </dgm:pt>
@@ -13503,10 +13498,10 @@
         <a:p>
           <a:pPr rtl="0"/>
           <a:r>
-            <a:rPr lang="en-US" smtClean="0"/>
+            <a:rPr lang="en-US" dirty="0" smtClean="0"/>
             <a:t>Those columns still have their JSLink pointing the JavaScript</a:t>
           </a:r>
-          <a:endParaRPr lang="en-US"/>
+          <a:endParaRPr lang="en-US" dirty="0"/>
         </a:p>
       </dgm:t>
     </dgm:pt>
@@ -13541,10 +13536,10 @@
         <a:p>
           <a:pPr rtl="0"/>
           <a:r>
-            <a:rPr lang="en-US" smtClean="0"/>
+            <a:rPr lang="en-US" dirty="0" smtClean="0"/>
             <a:t>Because it’s messy, it is almost impossible to upgrade</a:t>
           </a:r>
-          <a:endParaRPr lang="en-US"/>
+          <a:endParaRPr lang="en-US" dirty="0"/>
         </a:p>
       </dgm:t>
     </dgm:pt>
@@ -13579,10 +13574,10 @@
         <a:p>
           <a:pPr rtl="0"/>
           <a:r>
-            <a:rPr lang="en-US" smtClean="0"/>
+            <a:rPr lang="en-US" dirty="0" smtClean="0"/>
             <a:t>Module files cannot be overwritten through upgrade</a:t>
           </a:r>
-          <a:endParaRPr lang="en-US"/>
+          <a:endParaRPr lang="en-US" dirty="0"/>
         </a:p>
       </dgm:t>
     </dgm:pt>
@@ -13617,10 +13612,10 @@
         <a:p>
           <a:pPr rtl="0"/>
           <a:r>
-            <a:rPr lang="en-US" smtClean="0"/>
+            <a:rPr lang="en-US" dirty="0" smtClean="0"/>
             <a:t>Site Column instances need to be deleted before they can be upgraded, and therefore need to be deleted form any list using them (loss of data)</a:t>
           </a:r>
-          <a:endParaRPr lang="en-US"/>
+          <a:endParaRPr lang="en-US" dirty="0"/>
         </a:p>
       </dgm:t>
     </dgm:pt>
@@ -13785,10 +13780,10 @@
         <a:p>
           <a:pPr rtl="0"/>
           <a:r>
-            <a:rPr lang="en-US" smtClean="0"/>
+            <a:rPr lang="en-US" dirty="0" smtClean="0"/>
             <a:t>Pros</a:t>
           </a:r>
-          <a:endParaRPr lang="en-US"/>
+          <a:endParaRPr lang="en-US" dirty="0"/>
         </a:p>
       </dgm:t>
     </dgm:pt>
@@ -13823,10 +13818,10 @@
         <a:p>
           <a:pPr rtl="0"/>
           <a:r>
-            <a:rPr lang="en-US" smtClean="0"/>
+            <a:rPr lang="en-US" dirty="0" smtClean="0"/>
             <a:t>It’s easier to manage than individually setting the JSLink on all columns</a:t>
           </a:r>
-          <a:endParaRPr lang="en-US"/>
+          <a:endParaRPr lang="en-US" dirty="0"/>
         </a:p>
       </dgm:t>
     </dgm:pt>
@@ -13861,10 +13856,10 @@
         <a:p>
           <a:pPr rtl="0"/>
           <a:r>
-            <a:rPr lang="en-US" smtClean="0"/>
+            <a:rPr lang="en-US" dirty="0" smtClean="0"/>
             <a:t>Not exactly the same functionality as a custom field, but you do at least end up with a reusable component</a:t>
           </a:r>
-          <a:endParaRPr lang="en-US"/>
+          <a:endParaRPr lang="en-US" dirty="0"/>
         </a:p>
       </dgm:t>
     </dgm:pt>
@@ -13899,10 +13894,10 @@
         <a:p>
           <a:pPr rtl="0"/>
           <a:r>
-            <a:rPr lang="en-US" smtClean="0"/>
+            <a:rPr lang="en-US" dirty="0" smtClean="0"/>
             <a:t>Cons</a:t>
           </a:r>
-          <a:endParaRPr lang="en-US"/>
+          <a:endParaRPr lang="en-US" dirty="0"/>
         </a:p>
       </dgm:t>
     </dgm:pt>
@@ -14214,10 +14209,9 @@
           <a:avLst/>
         </a:prstGeom>
         <a:solidFill>
-          <a:schemeClr val="accent5">
-            <a:lumMod val="40000"/>
-            <a:lumOff val="60000"/>
-          </a:schemeClr>
+          <a:srgbClr val="ECECEC">
+            <a:alpha val="0"/>
+          </a:srgbClr>
         </a:solidFill>
         <a:ln>
           <a:noFill/>
@@ -14400,7 +14394,7 @@
           </a:pPr>
           <a:r>
             <a:rPr lang="en-US" sz="2800" kern="1200" dirty="0" smtClean="0"/>
-            <a:t>Show practical examples of CSR to customize forms and Views</a:t>
+            <a:t>Show practical examples of CSR to customize forms (and possibly Views)</a:t>
           </a:r>
           <a:endParaRPr lang="en-US" sz="2800" kern="1200" dirty="0"/>
         </a:p>
@@ -14586,341 +14580,6 @@
       <dsp:cNvGrpSpPr/>
     </dsp:nvGrpSpPr>
     <dsp:grpSpPr/>
-    <dsp:sp modelId="{092B7684-72A8-477C-9957-21AC8F6812BE}">
-      <dsp:nvSpPr>
-        <dsp:cNvPr id="0" name=""/>
-        <dsp:cNvSpPr/>
-      </dsp:nvSpPr>
-      <dsp:spPr>
-        <a:xfrm>
-          <a:off x="0" y="172741"/>
-          <a:ext cx="10515600" cy="647595"/>
-        </a:xfrm>
-        <a:prstGeom prst="roundRect">
-          <a:avLst/>
-        </a:prstGeom>
-        <a:solidFill>
-          <a:schemeClr val="accent1">
-            <a:hueOff val="0"/>
-            <a:satOff val="0"/>
-            <a:lumOff val="0"/>
-            <a:alphaOff val="0"/>
-          </a:schemeClr>
-        </a:solidFill>
-        <a:ln w="12700" cap="flat" cmpd="sng" algn="ctr">
-          <a:solidFill>
-            <a:schemeClr val="lt1">
-              <a:hueOff val="0"/>
-              <a:satOff val="0"/>
-              <a:lumOff val="0"/>
-              <a:alphaOff val="0"/>
-            </a:schemeClr>
-          </a:solidFill>
-          <a:prstDash val="solid"/>
-          <a:miter lim="800000"/>
-        </a:ln>
-        <a:effectLst/>
-      </dsp:spPr>
-      <dsp:style>
-        <a:lnRef idx="2">
-          <a:scrgbClr r="0" g="0" b="0"/>
-        </a:lnRef>
-        <a:fillRef idx="1">
-          <a:scrgbClr r="0" g="0" b="0"/>
-        </a:fillRef>
-        <a:effectRef idx="0">
-          <a:scrgbClr r="0" g="0" b="0"/>
-        </a:effectRef>
-        <a:fontRef idx="minor">
-          <a:schemeClr val="lt1"/>
-        </a:fontRef>
-      </dsp:style>
-      <dsp:txBody>
-        <a:bodyPr spcFirstLastPara="0" vert="horz" wrap="square" lIns="102870" tIns="102870" rIns="102870" bIns="102870" numCol="1" spcCol="1270" anchor="ctr" anchorCtr="0">
-          <a:noAutofit/>
-        </a:bodyPr>
-        <a:lstStyle/>
-        <a:p>
-          <a:pPr lvl="0" algn="l" defTabSz="1200150" rtl="0">
-            <a:lnSpc>
-              <a:spcPct val="90000"/>
-            </a:lnSpc>
-            <a:spcBef>
-              <a:spcPct val="0"/>
-            </a:spcBef>
-            <a:spcAft>
-              <a:spcPct val="35000"/>
-            </a:spcAft>
-          </a:pPr>
-          <a:r>
-            <a:rPr lang="en-US" sz="2700" kern="1200" dirty="0" smtClean="0"/>
-            <a:t>Pros</a:t>
-          </a:r>
-          <a:endParaRPr lang="en-US" sz="2700" kern="1200" dirty="0"/>
-        </a:p>
-      </dsp:txBody>
-      <dsp:txXfrm>
-        <a:off x="31613" y="204354"/>
-        <a:ext cx="10452374" cy="584369"/>
-      </dsp:txXfrm>
-    </dsp:sp>
-    <dsp:sp modelId="{86033895-64FE-4A77-9B06-D42A50E5F005}">
-      <dsp:nvSpPr>
-        <dsp:cNvPr id="0" name=""/>
-        <dsp:cNvSpPr/>
-      </dsp:nvSpPr>
-      <dsp:spPr>
-        <a:xfrm>
-          <a:off x="0" y="820336"/>
-          <a:ext cx="10515600" cy="1313414"/>
-        </a:xfrm>
-        <a:prstGeom prst="rect">
-          <a:avLst/>
-        </a:prstGeom>
-        <a:noFill/>
-        <a:ln>
-          <a:noFill/>
-        </a:ln>
-        <a:effectLst/>
-      </dsp:spPr>
-      <dsp:style>
-        <a:lnRef idx="0">
-          <a:scrgbClr r="0" g="0" b="0"/>
-        </a:lnRef>
-        <a:fillRef idx="0">
-          <a:scrgbClr r="0" g="0" b="0"/>
-        </a:fillRef>
-        <a:effectRef idx="0">
-          <a:scrgbClr r="0" g="0" b="0"/>
-        </a:effectRef>
-        <a:fontRef idx="minor"/>
-      </dsp:style>
-      <dsp:txBody>
-        <a:bodyPr spcFirstLastPara="0" vert="horz" wrap="square" lIns="333870" tIns="34290" rIns="192024" bIns="34290" numCol="1" spcCol="1270" anchor="t" anchorCtr="0">
-          <a:noAutofit/>
-        </a:bodyPr>
-        <a:lstStyle/>
-        <a:p>
-          <a:pPr marL="228600" lvl="1" indent="-228600" algn="l" defTabSz="933450" rtl="0">
-            <a:lnSpc>
-              <a:spcPct val="90000"/>
-            </a:lnSpc>
-            <a:spcBef>
-              <a:spcPct val="0"/>
-            </a:spcBef>
-            <a:spcAft>
-              <a:spcPct val="20000"/>
-            </a:spcAft>
-            <a:buChar char="••"/>
-          </a:pPr>
-          <a:r>
-            <a:rPr lang="en-US" sz="2100" kern="1200" smtClean="0"/>
-            <a:t>It seems like the right granularity, if you want to modify a field, modify it’s JSLink and you’ve modified it everywhere</a:t>
-          </a:r>
-          <a:endParaRPr lang="en-US" sz="2100" kern="1200"/>
-        </a:p>
-        <a:p>
-          <a:pPr marL="228600" lvl="1" indent="-228600" algn="l" defTabSz="933450" rtl="0">
-            <a:lnSpc>
-              <a:spcPct val="90000"/>
-            </a:lnSpc>
-            <a:spcBef>
-              <a:spcPct val="0"/>
-            </a:spcBef>
-            <a:spcAft>
-              <a:spcPct val="20000"/>
-            </a:spcAft>
-            <a:buChar char="••"/>
-          </a:pPr>
-          <a:r>
-            <a:rPr lang="en-US" sz="2100" kern="1200" smtClean="0"/>
-            <a:t>If you apply the same JS file as JSLink on two different fields, SharePoint is smart enough to only load it once</a:t>
-          </a:r>
-          <a:endParaRPr lang="en-US" sz="2100" kern="1200"/>
-        </a:p>
-      </dsp:txBody>
-      <dsp:txXfrm>
-        <a:off x="0" y="820336"/>
-        <a:ext cx="10515600" cy="1313414"/>
-      </dsp:txXfrm>
-    </dsp:sp>
-    <dsp:sp modelId="{47BB1A43-3559-42B4-8AF4-8223C80D03A6}">
-      <dsp:nvSpPr>
-        <dsp:cNvPr id="0" name=""/>
-        <dsp:cNvSpPr/>
-      </dsp:nvSpPr>
-      <dsp:spPr>
-        <a:xfrm>
-          <a:off x="0" y="2133751"/>
-          <a:ext cx="10515600" cy="647595"/>
-        </a:xfrm>
-        <a:prstGeom prst="roundRect">
-          <a:avLst/>
-        </a:prstGeom>
-        <a:solidFill>
-          <a:schemeClr val="accent1">
-            <a:hueOff val="0"/>
-            <a:satOff val="0"/>
-            <a:lumOff val="0"/>
-            <a:alphaOff val="0"/>
-          </a:schemeClr>
-        </a:solidFill>
-        <a:ln w="12700" cap="flat" cmpd="sng" algn="ctr">
-          <a:solidFill>
-            <a:schemeClr val="lt1">
-              <a:hueOff val="0"/>
-              <a:satOff val="0"/>
-              <a:lumOff val="0"/>
-              <a:alphaOff val="0"/>
-            </a:schemeClr>
-          </a:solidFill>
-          <a:prstDash val="solid"/>
-          <a:miter lim="800000"/>
-        </a:ln>
-        <a:effectLst/>
-      </dsp:spPr>
-      <dsp:style>
-        <a:lnRef idx="2">
-          <a:scrgbClr r="0" g="0" b="0"/>
-        </a:lnRef>
-        <a:fillRef idx="1">
-          <a:scrgbClr r="0" g="0" b="0"/>
-        </a:fillRef>
-        <a:effectRef idx="0">
-          <a:scrgbClr r="0" g="0" b="0"/>
-        </a:effectRef>
-        <a:fontRef idx="minor">
-          <a:schemeClr val="lt1"/>
-        </a:fontRef>
-      </dsp:style>
-      <dsp:txBody>
-        <a:bodyPr spcFirstLastPara="0" vert="horz" wrap="square" lIns="102870" tIns="102870" rIns="102870" bIns="102870" numCol="1" spcCol="1270" anchor="ctr" anchorCtr="0">
-          <a:noAutofit/>
-        </a:bodyPr>
-        <a:lstStyle/>
-        <a:p>
-          <a:pPr lvl="0" algn="l" defTabSz="1200150" rtl="0">
-            <a:lnSpc>
-              <a:spcPct val="90000"/>
-            </a:lnSpc>
-            <a:spcBef>
-              <a:spcPct val="0"/>
-            </a:spcBef>
-            <a:spcAft>
-              <a:spcPct val="35000"/>
-            </a:spcAft>
-          </a:pPr>
-          <a:r>
-            <a:rPr lang="en-US" sz="2700" kern="1200" dirty="0" smtClean="0"/>
-            <a:t>Cons</a:t>
-          </a:r>
-          <a:endParaRPr lang="en-US" sz="2700" kern="1200" dirty="0"/>
-        </a:p>
-      </dsp:txBody>
-      <dsp:txXfrm>
-        <a:off x="31613" y="2165364"/>
-        <a:ext cx="10452374" cy="584369"/>
-      </dsp:txXfrm>
-    </dsp:sp>
-    <dsp:sp modelId="{0955E407-48F9-4412-B1CE-2E66C281AA94}">
-      <dsp:nvSpPr>
-        <dsp:cNvPr id="0" name=""/>
-        <dsp:cNvSpPr/>
-      </dsp:nvSpPr>
-      <dsp:spPr>
-        <a:xfrm>
-          <a:off x="0" y="2781346"/>
-          <a:ext cx="10515600" cy="1397250"/>
-        </a:xfrm>
-        <a:prstGeom prst="rect">
-          <a:avLst/>
-        </a:prstGeom>
-        <a:noFill/>
-        <a:ln>
-          <a:noFill/>
-        </a:ln>
-        <a:effectLst/>
-      </dsp:spPr>
-      <dsp:style>
-        <a:lnRef idx="0">
-          <a:scrgbClr r="0" g="0" b="0"/>
-        </a:lnRef>
-        <a:fillRef idx="0">
-          <a:scrgbClr r="0" g="0" b="0"/>
-        </a:fillRef>
-        <a:effectRef idx="0">
-          <a:scrgbClr r="0" g="0" b="0"/>
-        </a:effectRef>
-        <a:fontRef idx="minor"/>
-      </dsp:style>
-      <dsp:txBody>
-        <a:bodyPr spcFirstLastPara="0" vert="horz" wrap="square" lIns="333870" tIns="34290" rIns="192024" bIns="34290" numCol="1" spcCol="1270" anchor="t" anchorCtr="0">
-          <a:noAutofit/>
-        </a:bodyPr>
-        <a:lstStyle/>
-        <a:p>
-          <a:pPr marL="228600" lvl="1" indent="-228600" algn="l" defTabSz="933450" rtl="0">
-            <a:lnSpc>
-              <a:spcPct val="90000"/>
-            </a:lnSpc>
-            <a:spcBef>
-              <a:spcPct val="0"/>
-            </a:spcBef>
-            <a:spcAft>
-              <a:spcPct val="20000"/>
-            </a:spcAft>
-            <a:buChar char="••"/>
-          </a:pPr>
-          <a:r>
-            <a:rPr lang="en-US" sz="2100" kern="1200" smtClean="0"/>
-            <a:t>Some column types have a read-only JSLink property</a:t>
-          </a:r>
-          <a:endParaRPr lang="en-US" sz="2100" kern="1200"/>
-        </a:p>
-        <a:p>
-          <a:pPr marL="457200" lvl="2" indent="-228600" algn="l" defTabSz="933450" rtl="0">
-            <a:lnSpc>
-              <a:spcPct val="90000"/>
-            </a:lnSpc>
-            <a:spcBef>
-              <a:spcPct val="0"/>
-            </a:spcBef>
-            <a:spcAft>
-              <a:spcPct val="20000"/>
-            </a:spcAft>
-            <a:buChar char="••"/>
-          </a:pPr>
-          <a:r>
-            <a:rPr lang="en-US" sz="2100" kern="1200" smtClean="0"/>
-            <a:t>The fact that JSLink is not supported doesn’t necessarily mean that CSR is not supported</a:t>
-          </a:r>
-          <a:endParaRPr lang="en-US" sz="2100" kern="1200"/>
-        </a:p>
-        <a:p>
-          <a:pPr marL="228600" lvl="1" indent="-228600" algn="l" defTabSz="933450" rtl="0">
-            <a:lnSpc>
-              <a:spcPct val="90000"/>
-            </a:lnSpc>
-            <a:spcBef>
-              <a:spcPct val="0"/>
-            </a:spcBef>
-            <a:spcAft>
-              <a:spcPct val="20000"/>
-            </a:spcAft>
-            <a:buChar char="••"/>
-          </a:pPr>
-          <a:r>
-            <a:rPr lang="en-US" sz="2100" kern="1200" smtClean="0"/>
-            <a:t>It can be difficult to manage if you have a lot of columns with a lot of templates applies through JSLink, a well thought out utility page could help overcome this</a:t>
-          </a:r>
-          <a:endParaRPr lang="en-US" sz="2100" kern="1200"/>
-        </a:p>
-      </dsp:txBody>
-      <dsp:txXfrm>
-        <a:off x="0" y="2781346"/>
-        <a:ext cx="10515600" cy="1397250"/>
-      </dsp:txXfrm>
-    </dsp:sp>
   </dsp:spTree>
 </dsp:drawing>
 </file>
@@ -14933,322 +14592,6 @@
       <dsp:cNvGrpSpPr/>
     </dsp:nvGrpSpPr>
     <dsp:grpSpPr/>
-    <dsp:sp modelId="{4D02DBC9-A055-4E20-8272-4315EED9D2EB}">
-      <dsp:nvSpPr>
-        <dsp:cNvPr id="0" name=""/>
-        <dsp:cNvSpPr/>
-      </dsp:nvSpPr>
-      <dsp:spPr>
-        <a:xfrm>
-          <a:off x="0" y="4531"/>
-          <a:ext cx="10515600" cy="719549"/>
-        </a:xfrm>
-        <a:prstGeom prst="roundRect">
-          <a:avLst/>
-        </a:prstGeom>
-        <a:solidFill>
-          <a:schemeClr val="accent1">
-            <a:hueOff val="0"/>
-            <a:satOff val="0"/>
-            <a:lumOff val="0"/>
-            <a:alphaOff val="0"/>
-          </a:schemeClr>
-        </a:solidFill>
-        <a:ln w="12700" cap="flat" cmpd="sng" algn="ctr">
-          <a:solidFill>
-            <a:schemeClr val="lt1">
-              <a:hueOff val="0"/>
-              <a:satOff val="0"/>
-              <a:lumOff val="0"/>
-              <a:alphaOff val="0"/>
-            </a:schemeClr>
-          </a:solidFill>
-          <a:prstDash val="solid"/>
-          <a:miter lim="800000"/>
-        </a:ln>
-        <a:effectLst/>
-      </dsp:spPr>
-      <dsp:style>
-        <a:lnRef idx="2">
-          <a:scrgbClr r="0" g="0" b="0"/>
-        </a:lnRef>
-        <a:fillRef idx="1">
-          <a:scrgbClr r="0" g="0" b="0"/>
-        </a:fillRef>
-        <a:effectRef idx="0">
-          <a:scrgbClr r="0" g="0" b="0"/>
-        </a:effectRef>
-        <a:fontRef idx="minor">
-          <a:schemeClr val="lt1"/>
-        </a:fontRef>
-      </dsp:style>
-      <dsp:txBody>
-        <a:bodyPr spcFirstLastPara="0" vert="horz" wrap="square" lIns="114300" tIns="114300" rIns="114300" bIns="114300" numCol="1" spcCol="1270" anchor="ctr" anchorCtr="0">
-          <a:noAutofit/>
-        </a:bodyPr>
-        <a:lstStyle/>
-        <a:p>
-          <a:pPr lvl="0" algn="l" defTabSz="1333500" rtl="0">
-            <a:lnSpc>
-              <a:spcPct val="90000"/>
-            </a:lnSpc>
-            <a:spcBef>
-              <a:spcPct val="0"/>
-            </a:spcBef>
-            <a:spcAft>
-              <a:spcPct val="35000"/>
-            </a:spcAft>
-          </a:pPr>
-          <a:r>
-            <a:rPr lang="en-US" sz="3000" kern="1200" smtClean="0"/>
-            <a:t>Pros</a:t>
-          </a:r>
-          <a:endParaRPr lang="en-US" sz="3000" kern="1200"/>
-        </a:p>
-      </dsp:txBody>
-      <dsp:txXfrm>
-        <a:off x="35125" y="39656"/>
-        <a:ext cx="10445350" cy="649299"/>
-      </dsp:txXfrm>
-    </dsp:sp>
-    <dsp:sp modelId="{EBBBE11B-D235-4ACC-88E8-0635057CD13B}">
-      <dsp:nvSpPr>
-        <dsp:cNvPr id="0" name=""/>
-        <dsp:cNvSpPr/>
-      </dsp:nvSpPr>
-      <dsp:spPr>
-        <a:xfrm>
-          <a:off x="0" y="724081"/>
-          <a:ext cx="10515600" cy="729675"/>
-        </a:xfrm>
-        <a:prstGeom prst="rect">
-          <a:avLst/>
-        </a:prstGeom>
-        <a:noFill/>
-        <a:ln>
-          <a:noFill/>
-        </a:ln>
-        <a:effectLst/>
-      </dsp:spPr>
-      <dsp:style>
-        <a:lnRef idx="0">
-          <a:scrgbClr r="0" g="0" b="0"/>
-        </a:lnRef>
-        <a:fillRef idx="0">
-          <a:scrgbClr r="0" g="0" b="0"/>
-        </a:fillRef>
-        <a:effectRef idx="0">
-          <a:scrgbClr r="0" g="0" b="0"/>
-        </a:effectRef>
-        <a:fontRef idx="minor"/>
-      </dsp:style>
-      <dsp:txBody>
-        <a:bodyPr spcFirstLastPara="0" vert="horz" wrap="square" lIns="333870" tIns="38100" rIns="213360" bIns="38100" numCol="1" spcCol="1270" anchor="t" anchorCtr="0">
-          <a:noAutofit/>
-        </a:bodyPr>
-        <a:lstStyle/>
-        <a:p>
-          <a:pPr marL="228600" lvl="1" indent="-228600" algn="l" defTabSz="1022350" rtl="0">
-            <a:lnSpc>
-              <a:spcPct val="90000"/>
-            </a:lnSpc>
-            <a:spcBef>
-              <a:spcPct val="0"/>
-            </a:spcBef>
-            <a:spcAft>
-              <a:spcPct val="20000"/>
-            </a:spcAft>
-            <a:buChar char="••"/>
-          </a:pPr>
-          <a:r>
-            <a:rPr lang="en-US" sz="2300" kern="1200" dirty="0" smtClean="0"/>
-            <a:t>This is kind of the nuclear option, your code gets loaded everywhere (obviously, that can also be a con)</a:t>
-          </a:r>
-          <a:endParaRPr lang="en-US" sz="2300" kern="1200" dirty="0"/>
-        </a:p>
-      </dsp:txBody>
-      <dsp:txXfrm>
-        <a:off x="0" y="724081"/>
-        <a:ext cx="10515600" cy="729675"/>
-      </dsp:txXfrm>
-    </dsp:sp>
-    <dsp:sp modelId="{C7CA6B79-0C26-44F0-A024-CEA74983A585}">
-      <dsp:nvSpPr>
-        <dsp:cNvPr id="0" name=""/>
-        <dsp:cNvSpPr/>
-      </dsp:nvSpPr>
-      <dsp:spPr>
-        <a:xfrm>
-          <a:off x="0" y="1453756"/>
-          <a:ext cx="10515600" cy="719549"/>
-        </a:xfrm>
-        <a:prstGeom prst="roundRect">
-          <a:avLst/>
-        </a:prstGeom>
-        <a:solidFill>
-          <a:schemeClr val="accent1">
-            <a:hueOff val="0"/>
-            <a:satOff val="0"/>
-            <a:lumOff val="0"/>
-            <a:alphaOff val="0"/>
-          </a:schemeClr>
-        </a:solidFill>
-        <a:ln w="12700" cap="flat" cmpd="sng" algn="ctr">
-          <a:solidFill>
-            <a:schemeClr val="lt1">
-              <a:hueOff val="0"/>
-              <a:satOff val="0"/>
-              <a:lumOff val="0"/>
-              <a:alphaOff val="0"/>
-            </a:schemeClr>
-          </a:solidFill>
-          <a:prstDash val="solid"/>
-          <a:miter lim="800000"/>
-        </a:ln>
-        <a:effectLst/>
-      </dsp:spPr>
-      <dsp:style>
-        <a:lnRef idx="2">
-          <a:scrgbClr r="0" g="0" b="0"/>
-        </a:lnRef>
-        <a:fillRef idx="1">
-          <a:scrgbClr r="0" g="0" b="0"/>
-        </a:fillRef>
-        <a:effectRef idx="0">
-          <a:scrgbClr r="0" g="0" b="0"/>
-        </a:effectRef>
-        <a:fontRef idx="minor">
-          <a:schemeClr val="lt1"/>
-        </a:fontRef>
-      </dsp:style>
-      <dsp:txBody>
-        <a:bodyPr spcFirstLastPara="0" vert="horz" wrap="square" lIns="114300" tIns="114300" rIns="114300" bIns="114300" numCol="1" spcCol="1270" anchor="ctr" anchorCtr="0">
-          <a:noAutofit/>
-        </a:bodyPr>
-        <a:lstStyle/>
-        <a:p>
-          <a:pPr lvl="0" algn="l" defTabSz="1333500" rtl="0">
-            <a:lnSpc>
-              <a:spcPct val="90000"/>
-            </a:lnSpc>
-            <a:spcBef>
-              <a:spcPct val="0"/>
-            </a:spcBef>
-            <a:spcAft>
-              <a:spcPct val="35000"/>
-            </a:spcAft>
-          </a:pPr>
-          <a:r>
-            <a:rPr lang="en-US" sz="3000" kern="1200" smtClean="0"/>
-            <a:t>Cons</a:t>
-          </a:r>
-          <a:endParaRPr lang="en-US" sz="3000" kern="1200"/>
-        </a:p>
-      </dsp:txBody>
-      <dsp:txXfrm>
-        <a:off x="35125" y="1488881"/>
-        <a:ext cx="10445350" cy="649299"/>
-      </dsp:txXfrm>
-    </dsp:sp>
-    <dsp:sp modelId="{7816BB9A-0D19-47E4-9A04-196296FCA00D}">
-      <dsp:nvSpPr>
-        <dsp:cNvPr id="0" name=""/>
-        <dsp:cNvSpPr/>
-      </dsp:nvSpPr>
-      <dsp:spPr>
-        <a:xfrm>
-          <a:off x="0" y="2173306"/>
-          <a:ext cx="10515600" cy="2173500"/>
-        </a:xfrm>
-        <a:prstGeom prst="rect">
-          <a:avLst/>
-        </a:prstGeom>
-        <a:noFill/>
-        <a:ln>
-          <a:noFill/>
-        </a:ln>
-        <a:effectLst/>
-      </dsp:spPr>
-      <dsp:style>
-        <a:lnRef idx="0">
-          <a:scrgbClr r="0" g="0" b="0"/>
-        </a:lnRef>
-        <a:fillRef idx="0">
-          <a:scrgbClr r="0" g="0" b="0"/>
-        </a:fillRef>
-        <a:effectRef idx="0">
-          <a:scrgbClr r="0" g="0" b="0"/>
-        </a:effectRef>
-        <a:fontRef idx="minor"/>
-      </dsp:style>
-      <dsp:txBody>
-        <a:bodyPr spcFirstLastPara="0" vert="horz" wrap="square" lIns="333870" tIns="38100" rIns="213360" bIns="38100" numCol="1" spcCol="1270" anchor="t" anchorCtr="0">
-          <a:noAutofit/>
-        </a:bodyPr>
-        <a:lstStyle/>
-        <a:p>
-          <a:pPr marL="228600" lvl="1" indent="-228600" algn="l" defTabSz="1022350" rtl="0">
-            <a:lnSpc>
-              <a:spcPct val="90000"/>
-            </a:lnSpc>
-            <a:spcBef>
-              <a:spcPct val="0"/>
-            </a:spcBef>
-            <a:spcAft>
-              <a:spcPct val="20000"/>
-            </a:spcAft>
-            <a:buChar char="••"/>
-          </a:pPr>
-          <a:r>
-            <a:rPr lang="en-US" sz="2300" kern="1200" smtClean="0"/>
-            <a:t>You need to make your code bullet-proof enough to run everywhere</a:t>
-          </a:r>
-          <a:endParaRPr lang="en-US" sz="2300" kern="1200"/>
-        </a:p>
-        <a:p>
-          <a:pPr marL="457200" lvl="2" indent="-228600" algn="l" defTabSz="1022350" rtl="0">
-            <a:lnSpc>
-              <a:spcPct val="90000"/>
-            </a:lnSpc>
-            <a:spcBef>
-              <a:spcPct val="0"/>
-            </a:spcBef>
-            <a:spcAft>
-              <a:spcPct val="20000"/>
-            </a:spcAft>
-            <a:buChar char="••"/>
-          </a:pPr>
-          <a:r>
-            <a:rPr lang="en-US" sz="2300" kern="1200" smtClean="0"/>
-            <a:t>i.e. Site Settings -&gt; Solutions -&gt; Add Solution dialog loads your code; guess what…SPClientTemplates isn’t loaded</a:t>
-          </a:r>
-          <a:endParaRPr lang="en-US" sz="2300" kern="1200"/>
-        </a:p>
-        <a:p>
-          <a:pPr marL="457200" lvl="2" indent="-228600" algn="l" defTabSz="1022350" rtl="0">
-            <a:lnSpc>
-              <a:spcPct val="90000"/>
-            </a:lnSpc>
-            <a:spcBef>
-              <a:spcPct val="0"/>
-            </a:spcBef>
-            <a:spcAft>
-              <a:spcPct val="20000"/>
-            </a:spcAft>
-            <a:buChar char="••"/>
-          </a:pPr>
-          <a:r>
-            <a:rPr lang="en-US" sz="2300" kern="1200" dirty="0" smtClean="0"/>
-            <a:t>It is pretty easy to do for CSR code, if SPClientTemplates is undefined, get out of Dodge; that’s probably all you need to do to make sure you don’t run on any non-form page, but you need to do it every time</a:t>
-          </a:r>
-          <a:endParaRPr lang="en-US" sz="2300" kern="1200" dirty="0"/>
-        </a:p>
-      </dsp:txBody>
-      <dsp:txXfrm>
-        <a:off x="0" y="2173306"/>
-        <a:ext cx="10515600" cy="2173500"/>
-      </dsp:txXfrm>
-    </dsp:sp>
   </dsp:spTree>
 </dsp:drawing>
 </file>
@@ -15261,311 +14604,6 @@
       <dsp:cNvGrpSpPr/>
     </dsp:nvGrpSpPr>
     <dsp:grpSpPr/>
-    <dsp:sp modelId="{EA38CC6F-8CB8-4C1D-9F3E-2DCCAD2A0C3E}">
-      <dsp:nvSpPr>
-        <dsp:cNvPr id="0" name=""/>
-        <dsp:cNvSpPr/>
-      </dsp:nvSpPr>
-      <dsp:spPr>
-        <a:xfrm>
-          <a:off x="0" y="432030"/>
-          <a:ext cx="10515600" cy="720087"/>
-        </a:xfrm>
-        <a:prstGeom prst="roundRect">
-          <a:avLst/>
-        </a:prstGeom>
-        <a:solidFill>
-          <a:schemeClr val="accent1">
-            <a:hueOff val="0"/>
-            <a:satOff val="0"/>
-            <a:lumOff val="0"/>
-            <a:alphaOff val="0"/>
-          </a:schemeClr>
-        </a:solidFill>
-        <a:ln w="12700" cap="flat" cmpd="sng" algn="ctr">
-          <a:solidFill>
-            <a:schemeClr val="lt1">
-              <a:hueOff val="0"/>
-              <a:satOff val="0"/>
-              <a:lumOff val="0"/>
-              <a:alphaOff val="0"/>
-            </a:schemeClr>
-          </a:solidFill>
-          <a:prstDash val="solid"/>
-          <a:miter lim="800000"/>
-        </a:ln>
-        <a:effectLst/>
-      </dsp:spPr>
-      <dsp:style>
-        <a:lnRef idx="2">
-          <a:scrgbClr r="0" g="0" b="0"/>
-        </a:lnRef>
-        <a:fillRef idx="1">
-          <a:scrgbClr r="0" g="0" b="0"/>
-        </a:fillRef>
-        <a:effectRef idx="0">
-          <a:scrgbClr r="0" g="0" b="0"/>
-        </a:effectRef>
-        <a:fontRef idx="minor">
-          <a:schemeClr val="lt1"/>
-        </a:fontRef>
-      </dsp:style>
-      <dsp:txBody>
-        <a:bodyPr spcFirstLastPara="0" vert="horz" wrap="square" lIns="102870" tIns="102870" rIns="102870" bIns="102870" numCol="1" spcCol="1270" anchor="ctr" anchorCtr="0">
-          <a:noAutofit/>
-        </a:bodyPr>
-        <a:lstStyle/>
-        <a:p>
-          <a:pPr lvl="0" algn="l" defTabSz="1200150" rtl="0">
-            <a:lnSpc>
-              <a:spcPct val="90000"/>
-            </a:lnSpc>
-            <a:spcBef>
-              <a:spcPct val="0"/>
-            </a:spcBef>
-            <a:spcAft>
-              <a:spcPct val="35000"/>
-            </a:spcAft>
-          </a:pPr>
-          <a:r>
-            <a:rPr lang="en-US" sz="2700" kern="1200" smtClean="0"/>
-            <a:t>Pros</a:t>
-          </a:r>
-          <a:endParaRPr lang="en-US" sz="2700" kern="1200"/>
-        </a:p>
-      </dsp:txBody>
-      <dsp:txXfrm>
-        <a:off x="35152" y="467182"/>
-        <a:ext cx="10445296" cy="649783"/>
-      </dsp:txXfrm>
-    </dsp:sp>
-    <dsp:sp modelId="{DE0058FF-A247-4DCE-83D5-23CDCC3770AD}">
-      <dsp:nvSpPr>
-        <dsp:cNvPr id="0" name=""/>
-        <dsp:cNvSpPr/>
-      </dsp:nvSpPr>
-      <dsp:spPr>
-        <a:xfrm>
-          <a:off x="0" y="1152117"/>
-          <a:ext cx="10515600" cy="1059840"/>
-        </a:xfrm>
-        <a:prstGeom prst="rect">
-          <a:avLst/>
-        </a:prstGeom>
-        <a:noFill/>
-        <a:ln>
-          <a:noFill/>
-        </a:ln>
-        <a:effectLst/>
-      </dsp:spPr>
-      <dsp:style>
-        <a:lnRef idx="0">
-          <a:scrgbClr r="0" g="0" b="0"/>
-        </a:lnRef>
-        <a:fillRef idx="0">
-          <a:scrgbClr r="0" g="0" b="0"/>
-        </a:fillRef>
-        <a:effectRef idx="0">
-          <a:scrgbClr r="0" g="0" b="0"/>
-        </a:effectRef>
-        <a:fontRef idx="minor"/>
-      </dsp:style>
-      <dsp:txBody>
-        <a:bodyPr spcFirstLastPara="0" vert="horz" wrap="square" lIns="333870" tIns="35560" rIns="199136" bIns="35560" numCol="1" spcCol="1270" anchor="t" anchorCtr="0">
-          <a:noAutofit/>
-        </a:bodyPr>
-        <a:lstStyle/>
-        <a:p>
-          <a:pPr marL="285750" lvl="1" indent="-285750" algn="l" defTabSz="1244600" rtl="0">
-            <a:lnSpc>
-              <a:spcPct val="90000"/>
-            </a:lnSpc>
-            <a:spcBef>
-              <a:spcPct val="0"/>
-            </a:spcBef>
-            <a:spcAft>
-              <a:spcPct val="20000"/>
-            </a:spcAft>
-            <a:buChar char="••"/>
-          </a:pPr>
-          <a:r>
-            <a:rPr lang="en-US" sz="2800" kern="1200" dirty="0" smtClean="0"/>
-            <a:t>Easy to deploy</a:t>
-          </a:r>
-          <a:endParaRPr lang="en-US" sz="2800" kern="1200" dirty="0"/>
-        </a:p>
-        <a:p>
-          <a:pPr marL="285750" lvl="1" indent="-285750" algn="l" defTabSz="1244600" rtl="0">
-            <a:lnSpc>
-              <a:spcPct val="90000"/>
-            </a:lnSpc>
-            <a:spcBef>
-              <a:spcPct val="0"/>
-            </a:spcBef>
-            <a:spcAft>
-              <a:spcPct val="20000"/>
-            </a:spcAft>
-            <a:buChar char="••"/>
-          </a:pPr>
-          <a:r>
-            <a:rPr lang="en-US" sz="2800" kern="1200" dirty="0" smtClean="0"/>
-            <a:t>Even easier to reuse</a:t>
-          </a:r>
-          <a:endParaRPr lang="en-US" sz="2800" kern="1200" dirty="0"/>
-        </a:p>
-      </dsp:txBody>
-      <dsp:txXfrm>
-        <a:off x="0" y="1152117"/>
-        <a:ext cx="10515600" cy="1059840"/>
-      </dsp:txXfrm>
-    </dsp:sp>
-    <dsp:sp modelId="{4167D577-FD8B-42CD-A696-16952CB882E0}">
-      <dsp:nvSpPr>
-        <dsp:cNvPr id="0" name=""/>
-        <dsp:cNvSpPr/>
-      </dsp:nvSpPr>
-      <dsp:spPr>
-        <a:xfrm>
-          <a:off x="0" y="2097431"/>
-          <a:ext cx="10515600" cy="647510"/>
-        </a:xfrm>
-        <a:prstGeom prst="roundRect">
-          <a:avLst/>
-        </a:prstGeom>
-        <a:solidFill>
-          <a:schemeClr val="accent1">
-            <a:hueOff val="0"/>
-            <a:satOff val="0"/>
-            <a:lumOff val="0"/>
-            <a:alphaOff val="0"/>
-          </a:schemeClr>
-        </a:solidFill>
-        <a:ln w="12700" cap="flat" cmpd="sng" algn="ctr">
-          <a:solidFill>
-            <a:schemeClr val="lt1">
-              <a:hueOff val="0"/>
-              <a:satOff val="0"/>
-              <a:lumOff val="0"/>
-              <a:alphaOff val="0"/>
-            </a:schemeClr>
-          </a:solidFill>
-          <a:prstDash val="solid"/>
-          <a:miter lim="800000"/>
-        </a:ln>
-        <a:effectLst/>
-      </dsp:spPr>
-      <dsp:style>
-        <a:lnRef idx="2">
-          <a:scrgbClr r="0" g="0" b="0"/>
-        </a:lnRef>
-        <a:fillRef idx="1">
-          <a:scrgbClr r="0" g="0" b="0"/>
-        </a:fillRef>
-        <a:effectRef idx="0">
-          <a:scrgbClr r="0" g="0" b="0"/>
-        </a:effectRef>
-        <a:fontRef idx="minor">
-          <a:schemeClr val="lt1"/>
-        </a:fontRef>
-      </dsp:style>
-      <dsp:txBody>
-        <a:bodyPr spcFirstLastPara="0" vert="horz" wrap="square" lIns="102870" tIns="102870" rIns="102870" bIns="102870" numCol="1" spcCol="1270" anchor="ctr" anchorCtr="0">
-          <a:noAutofit/>
-        </a:bodyPr>
-        <a:lstStyle/>
-        <a:p>
-          <a:pPr lvl="0" algn="l" defTabSz="1200150" rtl="0">
-            <a:lnSpc>
-              <a:spcPct val="90000"/>
-            </a:lnSpc>
-            <a:spcBef>
-              <a:spcPct val="0"/>
-            </a:spcBef>
-            <a:spcAft>
-              <a:spcPct val="35000"/>
-            </a:spcAft>
-          </a:pPr>
-          <a:r>
-            <a:rPr lang="en-US" sz="2700" kern="1200" smtClean="0"/>
-            <a:t>Cons</a:t>
-          </a:r>
-          <a:endParaRPr lang="en-US" sz="2700" kern="1200"/>
-        </a:p>
-      </dsp:txBody>
-      <dsp:txXfrm>
-        <a:off x="31609" y="2129040"/>
-        <a:ext cx="10452382" cy="584292"/>
-      </dsp:txXfrm>
-    </dsp:sp>
-    <dsp:sp modelId="{2834D177-C254-44E0-851D-F4CD0F43CAAB}">
-      <dsp:nvSpPr>
-        <dsp:cNvPr id="0" name=""/>
-        <dsp:cNvSpPr/>
-      </dsp:nvSpPr>
-      <dsp:spPr>
-        <a:xfrm>
-          <a:off x="0" y="2863474"/>
-          <a:ext cx="10515600" cy="1059840"/>
-        </a:xfrm>
-        <a:prstGeom prst="rect">
-          <a:avLst/>
-        </a:prstGeom>
-        <a:noFill/>
-        <a:ln>
-          <a:noFill/>
-        </a:ln>
-        <a:effectLst/>
-      </dsp:spPr>
-      <dsp:style>
-        <a:lnRef idx="0">
-          <a:scrgbClr r="0" g="0" b="0"/>
-        </a:lnRef>
-        <a:fillRef idx="0">
-          <a:scrgbClr r="0" g="0" b="0"/>
-        </a:fillRef>
-        <a:effectRef idx="0">
-          <a:scrgbClr r="0" g="0" b="0"/>
-        </a:effectRef>
-        <a:fontRef idx="minor"/>
-      </dsp:style>
-      <dsp:txBody>
-        <a:bodyPr spcFirstLastPara="0" vert="horz" wrap="square" lIns="333870" tIns="35560" rIns="199136" bIns="35560" numCol="1" spcCol="1270" anchor="t" anchorCtr="0">
-          <a:noAutofit/>
-        </a:bodyPr>
-        <a:lstStyle/>
-        <a:p>
-          <a:pPr marL="285750" lvl="1" indent="-285750" algn="l" defTabSz="1244600" rtl="0">
-            <a:lnSpc>
-              <a:spcPct val="90000"/>
-            </a:lnSpc>
-            <a:spcBef>
-              <a:spcPct val="0"/>
-            </a:spcBef>
-            <a:spcAft>
-              <a:spcPct val="20000"/>
-            </a:spcAft>
-            <a:buChar char="••"/>
-          </a:pPr>
-          <a:r>
-            <a:rPr lang="en-US" sz="2800" kern="1200" dirty="0" smtClean="0"/>
-            <a:t>I got </a:t>
-          </a:r>
-          <a:r>
-            <a:rPr lang="en-US" sz="2800" kern="1200" dirty="0" err="1" smtClean="0"/>
-            <a:t>nothin</a:t>
-          </a:r>
-          <a:r>
-            <a:rPr lang="en-US" sz="2800" kern="1200" dirty="0" smtClean="0"/>
-            <a:t>’, this is pure goodness</a:t>
-          </a:r>
-          <a:endParaRPr lang="en-US" sz="2800" kern="1200" dirty="0"/>
-        </a:p>
-      </dsp:txBody>
-      <dsp:txXfrm>
-        <a:off x="0" y="2863474"/>
-        <a:ext cx="10515600" cy="1059840"/>
-      </dsp:txXfrm>
-    </dsp:sp>
   </dsp:spTree>
 </dsp:drawing>
 </file>
@@ -17038,11 +16076,15 @@
           </a:r>
           <a:r>
             <a:rPr lang="en-US" sz="2000" kern="1200" dirty="0" smtClean="0"/>
-            <a:t>- Form, Field, Content Type, View, List View Web Part (XLSTListViewWebPart</a:t>
+            <a:t>- Form, Field, Content Type, View, List View Web Part </a:t>
           </a:r>
           <a:r>
-            <a:rPr lang="en-US" sz="500" kern="1200" dirty="0" smtClean="0"/>
-            <a:t>)</a:t>
+            <a:rPr lang="en-US" sz="2000" kern="1200" smtClean="0"/>
+            <a:t>(</a:t>
+          </a:r>
+          <a:r>
+            <a:rPr lang="en-US" sz="2000" kern="1200" smtClean="0"/>
+            <a:t>XLSTListViewWebPart)</a:t>
           </a:r>
           <a:endParaRPr lang="en-US" sz="500" kern="1200" dirty="0"/>
         </a:p>
@@ -17767,379 +16809,6 @@
       <dsp:cNvGrpSpPr/>
     </dsp:nvGrpSpPr>
     <dsp:grpSpPr/>
-    <dsp:sp modelId="{AF227D80-DF05-421C-A17B-5E4BABB9AFE1}">
-      <dsp:nvSpPr>
-        <dsp:cNvPr id="0" name=""/>
-        <dsp:cNvSpPr/>
-      </dsp:nvSpPr>
-      <dsp:spPr>
-        <a:xfrm>
-          <a:off x="0" y="206558"/>
-          <a:ext cx="10515600" cy="623610"/>
-        </a:xfrm>
-        <a:prstGeom prst="roundRect">
-          <a:avLst/>
-        </a:prstGeom>
-        <a:solidFill>
-          <a:schemeClr val="accent1">
-            <a:hueOff val="0"/>
-            <a:satOff val="0"/>
-            <a:lumOff val="0"/>
-            <a:alphaOff val="0"/>
-          </a:schemeClr>
-        </a:solidFill>
-        <a:ln w="12700" cap="flat" cmpd="sng" algn="ctr">
-          <a:solidFill>
-            <a:schemeClr val="lt1">
-              <a:hueOff val="0"/>
-              <a:satOff val="0"/>
-              <a:lumOff val="0"/>
-              <a:alphaOff val="0"/>
-            </a:schemeClr>
-          </a:solidFill>
-          <a:prstDash val="solid"/>
-          <a:miter lim="800000"/>
-        </a:ln>
-        <a:effectLst/>
-      </dsp:spPr>
-      <dsp:style>
-        <a:lnRef idx="2">
-          <a:scrgbClr r="0" g="0" b="0"/>
-        </a:lnRef>
-        <a:fillRef idx="1">
-          <a:scrgbClr r="0" g="0" b="0"/>
-        </a:fillRef>
-        <a:effectRef idx="0">
-          <a:scrgbClr r="0" g="0" b="0"/>
-        </a:effectRef>
-        <a:fontRef idx="minor">
-          <a:schemeClr val="lt1"/>
-        </a:fontRef>
-      </dsp:style>
-      <dsp:txBody>
-        <a:bodyPr spcFirstLastPara="0" vert="horz" wrap="square" lIns="99060" tIns="99060" rIns="99060" bIns="99060" numCol="1" spcCol="1270" anchor="ctr" anchorCtr="0">
-          <a:noAutofit/>
-        </a:bodyPr>
-        <a:lstStyle/>
-        <a:p>
-          <a:pPr lvl="0" algn="l" defTabSz="1155700" rtl="0">
-            <a:lnSpc>
-              <a:spcPct val="90000"/>
-            </a:lnSpc>
-            <a:spcBef>
-              <a:spcPct val="0"/>
-            </a:spcBef>
-            <a:spcAft>
-              <a:spcPct val="35000"/>
-            </a:spcAft>
-          </a:pPr>
-          <a:r>
-            <a:rPr lang="en-US" sz="2600" kern="1200" smtClean="0"/>
-            <a:t>Pros</a:t>
-          </a:r>
-          <a:endParaRPr lang="en-US" sz="2600" kern="1200"/>
-        </a:p>
-      </dsp:txBody>
-      <dsp:txXfrm>
-        <a:off x="30442" y="237000"/>
-        <a:ext cx="10454716" cy="562726"/>
-      </dsp:txXfrm>
-    </dsp:sp>
-    <dsp:sp modelId="{0BD53981-A40D-42E4-AEA8-8453F79ECFC6}">
-      <dsp:nvSpPr>
-        <dsp:cNvPr id="0" name=""/>
-        <dsp:cNvSpPr/>
-      </dsp:nvSpPr>
-      <dsp:spPr>
-        <a:xfrm>
-          <a:off x="0" y="830168"/>
-          <a:ext cx="10515600" cy="699660"/>
-        </a:xfrm>
-        <a:prstGeom prst="rect">
-          <a:avLst/>
-        </a:prstGeom>
-        <a:noFill/>
-        <a:ln>
-          <a:noFill/>
-        </a:ln>
-        <a:effectLst/>
-      </dsp:spPr>
-      <dsp:style>
-        <a:lnRef idx="0">
-          <a:scrgbClr r="0" g="0" b="0"/>
-        </a:lnRef>
-        <a:fillRef idx="0">
-          <a:scrgbClr r="0" g="0" b="0"/>
-        </a:fillRef>
-        <a:effectRef idx="0">
-          <a:scrgbClr r="0" g="0" b="0"/>
-        </a:effectRef>
-        <a:fontRef idx="minor"/>
-      </dsp:style>
-      <dsp:txBody>
-        <a:bodyPr spcFirstLastPara="0" vert="horz" wrap="square" lIns="333870" tIns="33020" rIns="184912" bIns="33020" numCol="1" spcCol="1270" anchor="t" anchorCtr="0">
-          <a:noAutofit/>
-        </a:bodyPr>
-        <a:lstStyle/>
-        <a:p>
-          <a:pPr marL="228600" lvl="1" indent="-228600" algn="l" defTabSz="889000" rtl="0">
-            <a:lnSpc>
-              <a:spcPct val="90000"/>
-            </a:lnSpc>
-            <a:spcBef>
-              <a:spcPct val="0"/>
-            </a:spcBef>
-            <a:spcAft>
-              <a:spcPct val="20000"/>
-            </a:spcAft>
-            <a:buChar char="••"/>
-          </a:pPr>
-          <a:r>
-            <a:rPr lang="en-US" sz="2000" kern="1200" smtClean="0"/>
-            <a:t>Very easy.</a:t>
-          </a:r>
-          <a:endParaRPr lang="en-US" sz="2000" kern="1200"/>
-        </a:p>
-        <a:p>
-          <a:pPr marL="228600" lvl="1" indent="-228600" algn="l" defTabSz="889000" rtl="0">
-            <a:lnSpc>
-              <a:spcPct val="90000"/>
-            </a:lnSpc>
-            <a:spcBef>
-              <a:spcPct val="0"/>
-            </a:spcBef>
-            <a:spcAft>
-              <a:spcPct val="20000"/>
-            </a:spcAft>
-            <a:buChar char="••"/>
-          </a:pPr>
-          <a:r>
-            <a:rPr lang="en-US" sz="2000" kern="1200" smtClean="0"/>
-            <a:t>Doesn’t require any additional code or packaging (i.e. it can be done OOB by a non-developer)</a:t>
-          </a:r>
-          <a:endParaRPr lang="en-US" sz="2000" kern="1200"/>
-        </a:p>
-      </dsp:txBody>
-      <dsp:txXfrm>
-        <a:off x="0" y="830168"/>
-        <a:ext cx="10515600" cy="699660"/>
-      </dsp:txXfrm>
-    </dsp:sp>
-    <dsp:sp modelId="{140C5289-FBF9-411C-A4B1-E6A0B82933CB}">
-      <dsp:nvSpPr>
-        <dsp:cNvPr id="0" name=""/>
-        <dsp:cNvSpPr/>
-      </dsp:nvSpPr>
-      <dsp:spPr>
-        <a:xfrm>
-          <a:off x="0" y="1529829"/>
-          <a:ext cx="10515600" cy="623610"/>
-        </a:xfrm>
-        <a:prstGeom prst="roundRect">
-          <a:avLst/>
-        </a:prstGeom>
-        <a:solidFill>
-          <a:schemeClr val="accent1">
-            <a:hueOff val="0"/>
-            <a:satOff val="0"/>
-            <a:lumOff val="0"/>
-            <a:alphaOff val="0"/>
-          </a:schemeClr>
-        </a:solidFill>
-        <a:ln w="12700" cap="flat" cmpd="sng" algn="ctr">
-          <a:solidFill>
-            <a:schemeClr val="lt1">
-              <a:hueOff val="0"/>
-              <a:satOff val="0"/>
-              <a:lumOff val="0"/>
-              <a:alphaOff val="0"/>
-            </a:schemeClr>
-          </a:solidFill>
-          <a:prstDash val="solid"/>
-          <a:miter lim="800000"/>
-        </a:ln>
-        <a:effectLst/>
-      </dsp:spPr>
-      <dsp:style>
-        <a:lnRef idx="2">
-          <a:scrgbClr r="0" g="0" b="0"/>
-        </a:lnRef>
-        <a:fillRef idx="1">
-          <a:scrgbClr r="0" g="0" b="0"/>
-        </a:fillRef>
-        <a:effectRef idx="0">
-          <a:scrgbClr r="0" g="0" b="0"/>
-        </a:effectRef>
-        <a:fontRef idx="minor">
-          <a:schemeClr val="lt1"/>
-        </a:fontRef>
-      </dsp:style>
-      <dsp:txBody>
-        <a:bodyPr spcFirstLastPara="0" vert="horz" wrap="square" lIns="99060" tIns="99060" rIns="99060" bIns="99060" numCol="1" spcCol="1270" anchor="ctr" anchorCtr="0">
-          <a:noAutofit/>
-        </a:bodyPr>
-        <a:lstStyle/>
-        <a:p>
-          <a:pPr lvl="0" algn="l" defTabSz="1155700" rtl="0">
-            <a:lnSpc>
-              <a:spcPct val="90000"/>
-            </a:lnSpc>
-            <a:spcBef>
-              <a:spcPct val="0"/>
-            </a:spcBef>
-            <a:spcAft>
-              <a:spcPct val="35000"/>
-            </a:spcAft>
-          </a:pPr>
-          <a:r>
-            <a:rPr lang="en-US" sz="2600" kern="1200" smtClean="0"/>
-            <a:t>Cons</a:t>
-          </a:r>
-          <a:endParaRPr lang="en-US" sz="2600" kern="1200"/>
-        </a:p>
-      </dsp:txBody>
-      <dsp:txXfrm>
-        <a:off x="30442" y="1560271"/>
-        <a:ext cx="10454716" cy="562726"/>
-      </dsp:txXfrm>
-    </dsp:sp>
-    <dsp:sp modelId="{5A443C98-69E1-4464-8FC5-6CBE3731C725}">
-      <dsp:nvSpPr>
-        <dsp:cNvPr id="0" name=""/>
-        <dsp:cNvSpPr/>
-      </dsp:nvSpPr>
-      <dsp:spPr>
-        <a:xfrm>
-          <a:off x="0" y="2153439"/>
-          <a:ext cx="10515600" cy="1991340"/>
-        </a:xfrm>
-        <a:prstGeom prst="rect">
-          <a:avLst/>
-        </a:prstGeom>
-        <a:noFill/>
-        <a:ln>
-          <a:noFill/>
-        </a:ln>
-        <a:effectLst/>
-      </dsp:spPr>
-      <dsp:style>
-        <a:lnRef idx="0">
-          <a:scrgbClr r="0" g="0" b="0"/>
-        </a:lnRef>
-        <a:fillRef idx="0">
-          <a:scrgbClr r="0" g="0" b="0"/>
-        </a:fillRef>
-        <a:effectRef idx="0">
-          <a:scrgbClr r="0" g="0" b="0"/>
-        </a:effectRef>
-        <a:fontRef idx="minor"/>
-      </dsp:style>
-      <dsp:txBody>
-        <a:bodyPr spcFirstLastPara="0" vert="horz" wrap="square" lIns="333870" tIns="33020" rIns="184912" bIns="33020" numCol="1" spcCol="1270" anchor="t" anchorCtr="0">
-          <a:noAutofit/>
-        </a:bodyPr>
-        <a:lstStyle/>
-        <a:p>
-          <a:pPr marL="228600" lvl="1" indent="-228600" algn="l" defTabSz="889000" rtl="0">
-            <a:lnSpc>
-              <a:spcPct val="90000"/>
-            </a:lnSpc>
-            <a:spcBef>
-              <a:spcPct val="0"/>
-            </a:spcBef>
-            <a:spcAft>
-              <a:spcPct val="20000"/>
-            </a:spcAft>
-            <a:buChar char="••"/>
-          </a:pPr>
-          <a:r>
-            <a:rPr lang="en-US" sz="2000" kern="1200" smtClean="0"/>
-            <a:t>It’s really a one-off solution (i.e. not enterprise)</a:t>
-          </a:r>
-          <a:endParaRPr lang="en-US" sz="2000" kern="1200"/>
-        </a:p>
-        <a:p>
-          <a:pPr marL="457200" lvl="2" indent="-228600" algn="l" defTabSz="889000" rtl="0">
-            <a:lnSpc>
-              <a:spcPct val="90000"/>
-            </a:lnSpc>
-            <a:spcBef>
-              <a:spcPct val="0"/>
-            </a:spcBef>
-            <a:spcAft>
-              <a:spcPct val="20000"/>
-            </a:spcAft>
-            <a:buChar char="••"/>
-          </a:pPr>
-          <a:r>
-            <a:rPr lang="en-US" sz="2000" kern="1200" smtClean="0"/>
-            <a:t>Needs to be applied separately to the new, edit, and display forms</a:t>
-          </a:r>
-          <a:endParaRPr lang="en-US" sz="2000" kern="1200"/>
-        </a:p>
-        <a:p>
-          <a:pPr marL="457200" lvl="2" indent="-228600" algn="l" defTabSz="889000" rtl="0">
-            <a:lnSpc>
-              <a:spcPct val="90000"/>
-            </a:lnSpc>
-            <a:spcBef>
-              <a:spcPct val="0"/>
-            </a:spcBef>
-            <a:spcAft>
-              <a:spcPct val="20000"/>
-            </a:spcAft>
-            <a:buChar char="••"/>
-          </a:pPr>
-          <a:r>
-            <a:rPr lang="en-US" sz="2000" kern="1200" smtClean="0"/>
-            <a:t>Needs to be applied separately to each view in which your field is displayed (or might be displayed)</a:t>
-          </a:r>
-          <a:endParaRPr lang="en-US" sz="2000" kern="1200"/>
-        </a:p>
-        <a:p>
-          <a:pPr marL="457200" lvl="2" indent="-228600" algn="l" defTabSz="889000" rtl="0">
-            <a:lnSpc>
-              <a:spcPct val="90000"/>
-            </a:lnSpc>
-            <a:spcBef>
-              <a:spcPct val="0"/>
-            </a:spcBef>
-            <a:spcAft>
-              <a:spcPct val="20000"/>
-            </a:spcAft>
-            <a:buChar char="••"/>
-          </a:pPr>
-          <a:r>
-            <a:rPr lang="en-US" sz="2000" kern="1200" smtClean="0"/>
-            <a:t>If somebody adds a view later, or modifies a view later, it may need to be applied again</a:t>
-          </a:r>
-          <a:endParaRPr lang="en-US" sz="2000" kern="1200"/>
-        </a:p>
-        <a:p>
-          <a:pPr marL="457200" lvl="2" indent="-228600" algn="l" defTabSz="889000" rtl="0">
-            <a:lnSpc>
-              <a:spcPct val="90000"/>
-            </a:lnSpc>
-            <a:spcBef>
-              <a:spcPct val="0"/>
-            </a:spcBef>
-            <a:spcAft>
-              <a:spcPct val="20000"/>
-            </a:spcAft>
-            <a:buChar char="••"/>
-          </a:pPr>
-          <a:r>
-            <a:rPr lang="en-US" sz="2000" kern="1200" smtClean="0"/>
-            <a:t>If you want to use it in another list, start the whole process over again</a:t>
-          </a:r>
-          <a:endParaRPr lang="en-US" sz="2000" kern="1200"/>
-        </a:p>
-      </dsp:txBody>
-      <dsp:txXfrm>
-        <a:off x="0" y="2153439"/>
-        <a:ext cx="10515600" cy="1991340"/>
-      </dsp:txXfrm>
-    </dsp:sp>
   </dsp:spTree>
 </dsp:drawing>
 </file>
@@ -18152,398 +16821,6 @@
       <dsp:cNvGrpSpPr/>
     </dsp:nvGrpSpPr>
     <dsp:grpSpPr/>
-    <dsp:sp modelId="{CA3AC844-2C66-4277-9E5A-7EB92D796C44}">
-      <dsp:nvSpPr>
-        <dsp:cNvPr id="0" name=""/>
-        <dsp:cNvSpPr/>
-      </dsp:nvSpPr>
-      <dsp:spPr>
-        <a:xfrm>
-          <a:off x="0" y="18188"/>
-          <a:ext cx="10515600" cy="623610"/>
-        </a:xfrm>
-        <a:prstGeom prst="roundRect">
-          <a:avLst/>
-        </a:prstGeom>
-        <a:solidFill>
-          <a:schemeClr val="accent1">
-            <a:hueOff val="0"/>
-            <a:satOff val="0"/>
-            <a:lumOff val="0"/>
-            <a:alphaOff val="0"/>
-          </a:schemeClr>
-        </a:solidFill>
-        <a:ln w="12700" cap="flat" cmpd="sng" algn="ctr">
-          <a:solidFill>
-            <a:schemeClr val="lt1">
-              <a:hueOff val="0"/>
-              <a:satOff val="0"/>
-              <a:lumOff val="0"/>
-              <a:alphaOff val="0"/>
-            </a:schemeClr>
-          </a:solidFill>
-          <a:prstDash val="solid"/>
-          <a:miter lim="800000"/>
-        </a:ln>
-        <a:effectLst/>
-      </dsp:spPr>
-      <dsp:style>
-        <a:lnRef idx="2">
-          <a:scrgbClr r="0" g="0" b="0"/>
-        </a:lnRef>
-        <a:fillRef idx="1">
-          <a:scrgbClr r="0" g="0" b="0"/>
-        </a:fillRef>
-        <a:effectRef idx="0">
-          <a:scrgbClr r="0" g="0" b="0"/>
-        </a:effectRef>
-        <a:fontRef idx="minor">
-          <a:schemeClr val="lt1"/>
-        </a:fontRef>
-      </dsp:style>
-      <dsp:txBody>
-        <a:bodyPr spcFirstLastPara="0" vert="horz" wrap="square" lIns="99060" tIns="99060" rIns="99060" bIns="99060" numCol="1" spcCol="1270" anchor="ctr" anchorCtr="0">
-          <a:noAutofit/>
-        </a:bodyPr>
-        <a:lstStyle/>
-        <a:p>
-          <a:pPr lvl="0" algn="l" defTabSz="1155700" rtl="0">
-            <a:lnSpc>
-              <a:spcPct val="90000"/>
-            </a:lnSpc>
-            <a:spcBef>
-              <a:spcPct val="0"/>
-            </a:spcBef>
-            <a:spcAft>
-              <a:spcPct val="35000"/>
-            </a:spcAft>
-          </a:pPr>
-          <a:r>
-            <a:rPr lang="en-US" sz="2600" kern="1200" smtClean="0"/>
-            <a:t>Pros</a:t>
-          </a:r>
-          <a:endParaRPr lang="en-US" sz="2600" kern="1200"/>
-        </a:p>
-      </dsp:txBody>
-      <dsp:txXfrm>
-        <a:off x="30442" y="48630"/>
-        <a:ext cx="10454716" cy="562726"/>
-      </dsp:txXfrm>
-    </dsp:sp>
-    <dsp:sp modelId="{891FD0DA-C686-4503-8FB2-846B3FA28339}">
-      <dsp:nvSpPr>
-        <dsp:cNvPr id="0" name=""/>
-        <dsp:cNvSpPr/>
-      </dsp:nvSpPr>
-      <dsp:spPr>
-        <a:xfrm>
-          <a:off x="0" y="641799"/>
-          <a:ext cx="10515600" cy="699660"/>
-        </a:xfrm>
-        <a:prstGeom prst="rect">
-          <a:avLst/>
-        </a:prstGeom>
-        <a:noFill/>
-        <a:ln>
-          <a:noFill/>
-        </a:ln>
-        <a:effectLst/>
-      </dsp:spPr>
-      <dsp:style>
-        <a:lnRef idx="0">
-          <a:scrgbClr r="0" g="0" b="0"/>
-        </a:lnRef>
-        <a:fillRef idx="0">
-          <a:scrgbClr r="0" g="0" b="0"/>
-        </a:fillRef>
-        <a:effectRef idx="0">
-          <a:scrgbClr r="0" g="0" b="0"/>
-        </a:effectRef>
-        <a:fontRef idx="minor"/>
-      </dsp:style>
-      <dsp:txBody>
-        <a:bodyPr spcFirstLastPara="0" vert="horz" wrap="square" lIns="333870" tIns="33020" rIns="184912" bIns="33020" numCol="1" spcCol="1270" anchor="t" anchorCtr="0">
-          <a:noAutofit/>
-        </a:bodyPr>
-        <a:lstStyle/>
-        <a:p>
-          <a:pPr marL="228600" lvl="1" indent="-228600" algn="l" defTabSz="889000" rtl="0">
-            <a:lnSpc>
-              <a:spcPct val="90000"/>
-            </a:lnSpc>
-            <a:spcBef>
-              <a:spcPct val="0"/>
-            </a:spcBef>
-            <a:spcAft>
-              <a:spcPct val="20000"/>
-            </a:spcAft>
-            <a:buChar char="••"/>
-          </a:pPr>
-          <a:r>
-            <a:rPr lang="en-US" sz="2000" kern="1200" smtClean="0"/>
-            <a:t>Somewhat self documenting</a:t>
-          </a:r>
-          <a:endParaRPr lang="en-US" sz="2000" kern="1200"/>
-        </a:p>
-        <a:p>
-          <a:pPr marL="228600" lvl="1" indent="-228600" algn="l" defTabSz="889000" rtl="0">
-            <a:lnSpc>
-              <a:spcPct val="90000"/>
-            </a:lnSpc>
-            <a:spcBef>
-              <a:spcPct val="0"/>
-            </a:spcBef>
-            <a:spcAft>
-              <a:spcPct val="20000"/>
-            </a:spcAft>
-            <a:buChar char="••"/>
-          </a:pPr>
-          <a:r>
-            <a:rPr lang="en-US" sz="2000" kern="1200" smtClean="0"/>
-            <a:t>Can be deployed by an admin through the browser</a:t>
-          </a:r>
-          <a:endParaRPr lang="en-US" sz="2000" kern="1200"/>
-        </a:p>
-      </dsp:txBody>
-      <dsp:txXfrm>
-        <a:off x="0" y="641799"/>
-        <a:ext cx="10515600" cy="699660"/>
-      </dsp:txXfrm>
-    </dsp:sp>
-    <dsp:sp modelId="{41CA6141-AE96-4880-992F-ABC551B279D4}">
-      <dsp:nvSpPr>
-        <dsp:cNvPr id="0" name=""/>
-        <dsp:cNvSpPr/>
-      </dsp:nvSpPr>
-      <dsp:spPr>
-        <a:xfrm>
-          <a:off x="0" y="1341459"/>
-          <a:ext cx="10515600" cy="623610"/>
-        </a:xfrm>
-        <a:prstGeom prst="roundRect">
-          <a:avLst/>
-        </a:prstGeom>
-        <a:solidFill>
-          <a:schemeClr val="accent1">
-            <a:hueOff val="0"/>
-            <a:satOff val="0"/>
-            <a:lumOff val="0"/>
-            <a:alphaOff val="0"/>
-          </a:schemeClr>
-        </a:solidFill>
-        <a:ln w="12700" cap="flat" cmpd="sng" algn="ctr">
-          <a:solidFill>
-            <a:schemeClr val="lt1">
-              <a:hueOff val="0"/>
-              <a:satOff val="0"/>
-              <a:lumOff val="0"/>
-              <a:alphaOff val="0"/>
-            </a:schemeClr>
-          </a:solidFill>
-          <a:prstDash val="solid"/>
-          <a:miter lim="800000"/>
-        </a:ln>
-        <a:effectLst/>
-      </dsp:spPr>
-      <dsp:style>
-        <a:lnRef idx="2">
-          <a:scrgbClr r="0" g="0" b="0"/>
-        </a:lnRef>
-        <a:fillRef idx="1">
-          <a:scrgbClr r="0" g="0" b="0"/>
-        </a:fillRef>
-        <a:effectRef idx="0">
-          <a:scrgbClr r="0" g="0" b="0"/>
-        </a:effectRef>
-        <a:fontRef idx="minor">
-          <a:schemeClr val="lt1"/>
-        </a:fontRef>
-      </dsp:style>
-      <dsp:txBody>
-        <a:bodyPr spcFirstLastPara="0" vert="horz" wrap="square" lIns="99060" tIns="99060" rIns="99060" bIns="99060" numCol="1" spcCol="1270" anchor="ctr" anchorCtr="0">
-          <a:noAutofit/>
-        </a:bodyPr>
-        <a:lstStyle/>
-        <a:p>
-          <a:pPr lvl="0" algn="l" defTabSz="1155700" rtl="0">
-            <a:lnSpc>
-              <a:spcPct val="90000"/>
-            </a:lnSpc>
-            <a:spcBef>
-              <a:spcPct val="0"/>
-            </a:spcBef>
-            <a:spcAft>
-              <a:spcPct val="35000"/>
-            </a:spcAft>
-          </a:pPr>
-          <a:r>
-            <a:rPr lang="en-US" sz="2600" kern="1200" smtClean="0"/>
-            <a:t>Cons</a:t>
-          </a:r>
-          <a:endParaRPr lang="en-US" sz="2600" kern="1200"/>
-        </a:p>
-      </dsp:txBody>
-      <dsp:txXfrm>
-        <a:off x="30442" y="1371901"/>
-        <a:ext cx="10454716" cy="562726"/>
-      </dsp:txXfrm>
-    </dsp:sp>
-    <dsp:sp modelId="{4D66EC53-1CA6-413A-9F89-66CFD243F937}">
-      <dsp:nvSpPr>
-        <dsp:cNvPr id="0" name=""/>
-        <dsp:cNvSpPr/>
-      </dsp:nvSpPr>
-      <dsp:spPr>
-        <a:xfrm>
-          <a:off x="0" y="1965069"/>
-          <a:ext cx="10515600" cy="2368080"/>
-        </a:xfrm>
-        <a:prstGeom prst="rect">
-          <a:avLst/>
-        </a:prstGeom>
-        <a:noFill/>
-        <a:ln>
-          <a:noFill/>
-        </a:ln>
-        <a:effectLst/>
-      </dsp:spPr>
-      <dsp:style>
-        <a:lnRef idx="0">
-          <a:scrgbClr r="0" g="0" b="0"/>
-        </a:lnRef>
-        <a:fillRef idx="0">
-          <a:scrgbClr r="0" g="0" b="0"/>
-        </a:fillRef>
-        <a:effectRef idx="0">
-          <a:scrgbClr r="0" g="0" b="0"/>
-        </a:effectRef>
-        <a:fontRef idx="minor"/>
-      </dsp:style>
-      <dsp:txBody>
-        <a:bodyPr spcFirstLastPara="0" vert="horz" wrap="square" lIns="333870" tIns="33020" rIns="184912" bIns="33020" numCol="1" spcCol="1270" anchor="t" anchorCtr="0">
-          <a:noAutofit/>
-        </a:bodyPr>
-        <a:lstStyle/>
-        <a:p>
-          <a:pPr marL="228600" lvl="1" indent="-228600" algn="l" defTabSz="889000" rtl="0">
-            <a:lnSpc>
-              <a:spcPct val="90000"/>
-            </a:lnSpc>
-            <a:spcBef>
-              <a:spcPct val="0"/>
-            </a:spcBef>
-            <a:spcAft>
-              <a:spcPct val="20000"/>
-            </a:spcAft>
-            <a:buChar char="••"/>
-          </a:pPr>
-          <a:r>
-            <a:rPr lang="en-US" sz="2000" kern="1200" smtClean="0"/>
-            <a:t>It is a messy solution (i.e. does not uninstall cleanly)</a:t>
-          </a:r>
-          <a:endParaRPr lang="en-US" sz="2000" kern="1200"/>
-        </a:p>
-        <a:p>
-          <a:pPr marL="457200" lvl="2" indent="-228600" algn="l" defTabSz="889000" rtl="0">
-            <a:lnSpc>
-              <a:spcPct val="90000"/>
-            </a:lnSpc>
-            <a:spcBef>
-              <a:spcPct val="0"/>
-            </a:spcBef>
-            <a:spcAft>
-              <a:spcPct val="20000"/>
-            </a:spcAft>
-            <a:buChar char="••"/>
-          </a:pPr>
-          <a:r>
-            <a:rPr lang="en-US" sz="2000" kern="1200" smtClean="0"/>
-            <a:t>It leaves behind any instances like site columns</a:t>
-          </a:r>
-          <a:endParaRPr lang="en-US" sz="2000" kern="1200"/>
-        </a:p>
-        <a:p>
-          <a:pPr marL="457200" lvl="2" indent="-228600" algn="l" defTabSz="889000" rtl="0">
-            <a:lnSpc>
-              <a:spcPct val="90000"/>
-            </a:lnSpc>
-            <a:spcBef>
-              <a:spcPct val="0"/>
-            </a:spcBef>
-            <a:spcAft>
-              <a:spcPct val="20000"/>
-            </a:spcAft>
-            <a:buChar char="••"/>
-          </a:pPr>
-          <a:r>
-            <a:rPr lang="en-US" sz="2000" kern="1200" smtClean="0"/>
-            <a:t>Those columns still have their JSLink pointing the JavaScript</a:t>
-          </a:r>
-          <a:endParaRPr lang="en-US" sz="2000" kern="1200"/>
-        </a:p>
-        <a:p>
-          <a:pPr marL="228600" lvl="1" indent="-228600" algn="l" defTabSz="889000" rtl="0">
-            <a:lnSpc>
-              <a:spcPct val="90000"/>
-            </a:lnSpc>
-            <a:spcBef>
-              <a:spcPct val="0"/>
-            </a:spcBef>
-            <a:spcAft>
-              <a:spcPct val="20000"/>
-            </a:spcAft>
-            <a:buChar char="••"/>
-          </a:pPr>
-          <a:r>
-            <a:rPr lang="en-US" sz="2000" kern="1200" smtClean="0"/>
-            <a:t>Because it’s messy, it is almost impossible to upgrade</a:t>
-          </a:r>
-          <a:endParaRPr lang="en-US" sz="2000" kern="1200"/>
-        </a:p>
-        <a:p>
-          <a:pPr marL="457200" lvl="2" indent="-228600" algn="l" defTabSz="889000" rtl="0">
-            <a:lnSpc>
-              <a:spcPct val="90000"/>
-            </a:lnSpc>
-            <a:spcBef>
-              <a:spcPct val="0"/>
-            </a:spcBef>
-            <a:spcAft>
-              <a:spcPct val="20000"/>
-            </a:spcAft>
-            <a:buChar char="••"/>
-          </a:pPr>
-          <a:r>
-            <a:rPr lang="en-US" sz="2000" kern="1200" smtClean="0"/>
-            <a:t>Module files cannot be overwritten through upgrade</a:t>
-          </a:r>
-          <a:endParaRPr lang="en-US" sz="2000" kern="1200"/>
-        </a:p>
-        <a:p>
-          <a:pPr marL="457200" lvl="2" indent="-228600" algn="l" defTabSz="889000" rtl="0">
-            <a:lnSpc>
-              <a:spcPct val="90000"/>
-            </a:lnSpc>
-            <a:spcBef>
-              <a:spcPct val="0"/>
-            </a:spcBef>
-            <a:spcAft>
-              <a:spcPct val="20000"/>
-            </a:spcAft>
-            <a:buChar char="••"/>
-          </a:pPr>
-          <a:r>
-            <a:rPr lang="en-US" sz="2000" kern="1200" smtClean="0"/>
-            <a:t>Site Column instances need to be deleted before they can be upgraded, and therefore need to be deleted form any list using them (loss of data)</a:t>
-          </a:r>
-          <a:endParaRPr lang="en-US" sz="2000" kern="1200"/>
-        </a:p>
-      </dsp:txBody>
-      <dsp:txXfrm>
-        <a:off x="0" y="1965069"/>
-        <a:ext cx="10515600" cy="2368080"/>
-      </dsp:txXfrm>
-    </dsp:sp>
   </dsp:spTree>
 </dsp:drawing>
 </file>
@@ -18556,360 +16833,6 @@
       <dsp:cNvGrpSpPr/>
     </dsp:nvGrpSpPr>
     <dsp:grpSpPr/>
-    <dsp:sp modelId="{F4BD8C17-4D40-4A8E-A2E4-2B294FB4C492}">
-      <dsp:nvSpPr>
-        <dsp:cNvPr id="0" name=""/>
-        <dsp:cNvSpPr/>
-      </dsp:nvSpPr>
-      <dsp:spPr>
-        <a:xfrm>
-          <a:off x="0" y="59550"/>
-          <a:ext cx="10515600" cy="647595"/>
-        </a:xfrm>
-        <a:prstGeom prst="roundRect">
-          <a:avLst/>
-        </a:prstGeom>
-        <a:solidFill>
-          <a:schemeClr val="accent1">
-            <a:hueOff val="0"/>
-            <a:satOff val="0"/>
-            <a:lumOff val="0"/>
-            <a:alphaOff val="0"/>
-          </a:schemeClr>
-        </a:solidFill>
-        <a:ln w="12700" cap="flat" cmpd="sng" algn="ctr">
-          <a:solidFill>
-            <a:schemeClr val="lt1">
-              <a:hueOff val="0"/>
-              <a:satOff val="0"/>
-              <a:lumOff val="0"/>
-              <a:alphaOff val="0"/>
-            </a:schemeClr>
-          </a:solidFill>
-          <a:prstDash val="solid"/>
-          <a:miter lim="800000"/>
-        </a:ln>
-        <a:effectLst/>
-      </dsp:spPr>
-      <dsp:style>
-        <a:lnRef idx="2">
-          <a:scrgbClr r="0" g="0" b="0"/>
-        </a:lnRef>
-        <a:fillRef idx="1">
-          <a:scrgbClr r="0" g="0" b="0"/>
-        </a:fillRef>
-        <a:effectRef idx="0">
-          <a:scrgbClr r="0" g="0" b="0"/>
-        </a:effectRef>
-        <a:fontRef idx="minor">
-          <a:schemeClr val="lt1"/>
-        </a:fontRef>
-      </dsp:style>
-      <dsp:txBody>
-        <a:bodyPr spcFirstLastPara="0" vert="horz" wrap="square" lIns="102870" tIns="102870" rIns="102870" bIns="102870" numCol="1" spcCol="1270" anchor="ctr" anchorCtr="0">
-          <a:noAutofit/>
-        </a:bodyPr>
-        <a:lstStyle/>
-        <a:p>
-          <a:pPr lvl="0" algn="l" defTabSz="1200150" rtl="0">
-            <a:lnSpc>
-              <a:spcPct val="90000"/>
-            </a:lnSpc>
-            <a:spcBef>
-              <a:spcPct val="0"/>
-            </a:spcBef>
-            <a:spcAft>
-              <a:spcPct val="35000"/>
-            </a:spcAft>
-          </a:pPr>
-          <a:r>
-            <a:rPr lang="en-US" sz="2700" kern="1200" smtClean="0"/>
-            <a:t>Pros</a:t>
-          </a:r>
-          <a:endParaRPr lang="en-US" sz="2700" kern="1200"/>
-        </a:p>
-      </dsp:txBody>
-      <dsp:txXfrm>
-        <a:off x="31613" y="91163"/>
-        <a:ext cx="10452374" cy="584369"/>
-      </dsp:txXfrm>
-    </dsp:sp>
-    <dsp:sp modelId="{5A95E0BC-F563-40DF-B475-D53015EB85A6}">
-      <dsp:nvSpPr>
-        <dsp:cNvPr id="0" name=""/>
-        <dsp:cNvSpPr/>
-      </dsp:nvSpPr>
-      <dsp:spPr>
-        <a:xfrm>
-          <a:off x="0" y="707145"/>
-          <a:ext cx="10515600" cy="1033964"/>
-        </a:xfrm>
-        <a:prstGeom prst="rect">
-          <a:avLst/>
-        </a:prstGeom>
-        <a:noFill/>
-        <a:ln>
-          <a:noFill/>
-        </a:ln>
-        <a:effectLst/>
-      </dsp:spPr>
-      <dsp:style>
-        <a:lnRef idx="0">
-          <a:scrgbClr r="0" g="0" b="0"/>
-        </a:lnRef>
-        <a:fillRef idx="0">
-          <a:scrgbClr r="0" g="0" b="0"/>
-        </a:fillRef>
-        <a:effectRef idx="0">
-          <a:scrgbClr r="0" g="0" b="0"/>
-        </a:effectRef>
-        <a:fontRef idx="minor"/>
-      </dsp:style>
-      <dsp:txBody>
-        <a:bodyPr spcFirstLastPara="0" vert="horz" wrap="square" lIns="333870" tIns="34290" rIns="192024" bIns="34290" numCol="1" spcCol="1270" anchor="t" anchorCtr="0">
-          <a:noAutofit/>
-        </a:bodyPr>
-        <a:lstStyle/>
-        <a:p>
-          <a:pPr marL="228600" lvl="1" indent="-228600" algn="l" defTabSz="933450" rtl="0">
-            <a:lnSpc>
-              <a:spcPct val="90000"/>
-            </a:lnSpc>
-            <a:spcBef>
-              <a:spcPct val="0"/>
-            </a:spcBef>
-            <a:spcAft>
-              <a:spcPct val="20000"/>
-            </a:spcAft>
-            <a:buChar char="••"/>
-          </a:pPr>
-          <a:r>
-            <a:rPr lang="en-US" sz="2100" kern="1200" smtClean="0"/>
-            <a:t>It’s easier to manage than individually setting the JSLink on all columns</a:t>
-          </a:r>
-          <a:endParaRPr lang="en-US" sz="2100" kern="1200"/>
-        </a:p>
-        <a:p>
-          <a:pPr marL="228600" lvl="1" indent="-228600" algn="l" defTabSz="933450" rtl="0">
-            <a:lnSpc>
-              <a:spcPct val="90000"/>
-            </a:lnSpc>
-            <a:spcBef>
-              <a:spcPct val="0"/>
-            </a:spcBef>
-            <a:spcAft>
-              <a:spcPct val="20000"/>
-            </a:spcAft>
-            <a:buChar char="••"/>
-          </a:pPr>
-          <a:r>
-            <a:rPr lang="en-US" sz="2100" kern="1200" smtClean="0"/>
-            <a:t>Not exactly the same functionality as a custom field, but you do at least end up with a reusable component</a:t>
-          </a:r>
-          <a:endParaRPr lang="en-US" sz="2100" kern="1200"/>
-        </a:p>
-      </dsp:txBody>
-      <dsp:txXfrm>
-        <a:off x="0" y="707145"/>
-        <a:ext cx="10515600" cy="1033964"/>
-      </dsp:txXfrm>
-    </dsp:sp>
-    <dsp:sp modelId="{33E875D6-CACA-4832-88DC-C4CFAA2C9275}">
-      <dsp:nvSpPr>
-        <dsp:cNvPr id="0" name=""/>
-        <dsp:cNvSpPr/>
-      </dsp:nvSpPr>
-      <dsp:spPr>
-        <a:xfrm>
-          <a:off x="0" y="1741110"/>
-          <a:ext cx="10515600" cy="647595"/>
-        </a:xfrm>
-        <a:prstGeom prst="roundRect">
-          <a:avLst/>
-        </a:prstGeom>
-        <a:solidFill>
-          <a:schemeClr val="accent1">
-            <a:hueOff val="0"/>
-            <a:satOff val="0"/>
-            <a:lumOff val="0"/>
-            <a:alphaOff val="0"/>
-          </a:schemeClr>
-        </a:solidFill>
-        <a:ln w="12700" cap="flat" cmpd="sng" algn="ctr">
-          <a:solidFill>
-            <a:schemeClr val="lt1">
-              <a:hueOff val="0"/>
-              <a:satOff val="0"/>
-              <a:lumOff val="0"/>
-              <a:alphaOff val="0"/>
-            </a:schemeClr>
-          </a:solidFill>
-          <a:prstDash val="solid"/>
-          <a:miter lim="800000"/>
-        </a:ln>
-        <a:effectLst/>
-      </dsp:spPr>
-      <dsp:style>
-        <a:lnRef idx="2">
-          <a:scrgbClr r="0" g="0" b="0"/>
-        </a:lnRef>
-        <a:fillRef idx="1">
-          <a:scrgbClr r="0" g="0" b="0"/>
-        </a:fillRef>
-        <a:effectRef idx="0">
-          <a:scrgbClr r="0" g="0" b="0"/>
-        </a:effectRef>
-        <a:fontRef idx="minor">
-          <a:schemeClr val="lt1"/>
-        </a:fontRef>
-      </dsp:style>
-      <dsp:txBody>
-        <a:bodyPr spcFirstLastPara="0" vert="horz" wrap="square" lIns="102870" tIns="102870" rIns="102870" bIns="102870" numCol="1" spcCol="1270" anchor="ctr" anchorCtr="0">
-          <a:noAutofit/>
-        </a:bodyPr>
-        <a:lstStyle/>
-        <a:p>
-          <a:pPr lvl="0" algn="l" defTabSz="1200150" rtl="0">
-            <a:lnSpc>
-              <a:spcPct val="90000"/>
-            </a:lnSpc>
-            <a:spcBef>
-              <a:spcPct val="0"/>
-            </a:spcBef>
-            <a:spcAft>
-              <a:spcPct val="35000"/>
-            </a:spcAft>
-          </a:pPr>
-          <a:r>
-            <a:rPr lang="en-US" sz="2700" kern="1200" smtClean="0"/>
-            <a:t>Cons</a:t>
-          </a:r>
-          <a:endParaRPr lang="en-US" sz="2700" kern="1200"/>
-        </a:p>
-      </dsp:txBody>
-      <dsp:txXfrm>
-        <a:off x="31613" y="1772723"/>
-        <a:ext cx="10452374" cy="584369"/>
-      </dsp:txXfrm>
-    </dsp:sp>
-    <dsp:sp modelId="{7188A1C8-E603-416D-8EA5-2D5ACD83B507}">
-      <dsp:nvSpPr>
-        <dsp:cNvPr id="0" name=""/>
-        <dsp:cNvSpPr/>
-      </dsp:nvSpPr>
-      <dsp:spPr>
-        <a:xfrm>
-          <a:off x="0" y="2388705"/>
-          <a:ext cx="10515600" cy="2347379"/>
-        </a:xfrm>
-        <a:prstGeom prst="rect">
-          <a:avLst/>
-        </a:prstGeom>
-        <a:noFill/>
-        <a:ln>
-          <a:noFill/>
-        </a:ln>
-        <a:effectLst/>
-      </dsp:spPr>
-      <dsp:style>
-        <a:lnRef idx="0">
-          <a:scrgbClr r="0" g="0" b="0"/>
-        </a:lnRef>
-        <a:fillRef idx="0">
-          <a:scrgbClr r="0" g="0" b="0"/>
-        </a:fillRef>
-        <a:effectRef idx="0">
-          <a:scrgbClr r="0" g="0" b="0"/>
-        </a:effectRef>
-        <a:fontRef idx="minor"/>
-      </dsp:style>
-      <dsp:txBody>
-        <a:bodyPr spcFirstLastPara="0" vert="horz" wrap="square" lIns="333870" tIns="34290" rIns="192024" bIns="34290" numCol="1" spcCol="1270" anchor="t" anchorCtr="0">
-          <a:noAutofit/>
-        </a:bodyPr>
-        <a:lstStyle/>
-        <a:p>
-          <a:pPr marL="228600" lvl="1" indent="-228600" algn="l" defTabSz="933450" rtl="0">
-            <a:lnSpc>
-              <a:spcPct val="90000"/>
-            </a:lnSpc>
-            <a:spcBef>
-              <a:spcPct val="0"/>
-            </a:spcBef>
-            <a:spcAft>
-              <a:spcPct val="20000"/>
-            </a:spcAft>
-            <a:buChar char="••"/>
-          </a:pPr>
-          <a:r>
-            <a:rPr lang="en-US" sz="2100" kern="1200" dirty="0" smtClean="0"/>
-            <a:t>JSLink on Content Types does not get called at all for Views; new, edit, and display forms only</a:t>
-          </a:r>
-          <a:endParaRPr lang="en-US" sz="2100" kern="1200" dirty="0"/>
-        </a:p>
-        <a:p>
-          <a:pPr marL="228600" lvl="1" indent="-228600" algn="l" defTabSz="933450" rtl="0">
-            <a:lnSpc>
-              <a:spcPct val="90000"/>
-            </a:lnSpc>
-            <a:spcBef>
-              <a:spcPct val="0"/>
-            </a:spcBef>
-            <a:spcAft>
-              <a:spcPct val="20000"/>
-            </a:spcAft>
-            <a:buChar char="••"/>
-          </a:pPr>
-          <a:r>
-            <a:rPr lang="en-US" sz="2100" kern="1200" dirty="0" smtClean="0"/>
-            <a:t>List Content Types do NOT get updated when you set the JSLink on site content types, even if you say push changes down</a:t>
-          </a:r>
-          <a:endParaRPr lang="en-US" sz="2100" kern="1200" dirty="0"/>
-        </a:p>
-        <a:p>
-          <a:pPr marL="228600" lvl="1" indent="-228600" algn="l" defTabSz="933450" rtl="0">
-            <a:lnSpc>
-              <a:spcPct val="90000"/>
-            </a:lnSpc>
-            <a:spcBef>
-              <a:spcPct val="0"/>
-            </a:spcBef>
-            <a:spcAft>
-              <a:spcPct val="20000"/>
-            </a:spcAft>
-            <a:buChar char="••"/>
-          </a:pPr>
-          <a:r>
-            <a:rPr lang="en-US" sz="2100" kern="1200" dirty="0" smtClean="0"/>
-            <a:t>Again it cannot be set on some content types…including Event (i.e. no calendars) and Survey</a:t>
-          </a:r>
-          <a:endParaRPr lang="en-US" sz="2100" kern="1200" dirty="0"/>
-        </a:p>
-        <a:p>
-          <a:pPr marL="228600" lvl="1" indent="-228600" algn="l" defTabSz="933450" rtl="0">
-            <a:lnSpc>
-              <a:spcPct val="90000"/>
-            </a:lnSpc>
-            <a:spcBef>
-              <a:spcPct val="0"/>
-            </a:spcBef>
-            <a:spcAft>
-              <a:spcPct val="20000"/>
-            </a:spcAft>
-            <a:buChar char="••"/>
-          </a:pPr>
-          <a:r>
-            <a:rPr lang="en-US" sz="2100" kern="1200" dirty="0" smtClean="0"/>
-            <a:t>The fact that JSLink is not supported doesn’t necessarily mean that CSR is not supported</a:t>
-          </a:r>
-          <a:endParaRPr lang="en-US" sz="2100" kern="1200" dirty="0"/>
-        </a:p>
-      </dsp:txBody>
-      <dsp:txXfrm>
-        <a:off x="0" y="2388705"/>
-        <a:ext cx="10515600" cy="2347379"/>
-      </dsp:txXfrm>
-    </dsp:sp>
   </dsp:spTree>
 </dsp:drawing>
 </file>
@@ -33540,7 +31463,7 @@
           <a:p>
             <a:fld id="{02BC24F2-A104-4C75-B4B5-E72BF9C1C018}" type="datetimeFigureOut">
               <a:rPr lang="en-US" smtClean="0"/>
-              <a:t>3/12/2016</a:t>
+              <a:t>3/14/2016</a:t>
             </a:fld>
             <a:endParaRPr lang="en-US" dirty="0"/>
           </a:p>
@@ -33852,7 +31775,7 @@
           <a:bodyPr/>
           <a:lstStyle/>
           <a:p>
-            <a:endParaRPr lang="en-US"/>
+            <a:endParaRPr lang="en-US" dirty="0"/>
           </a:p>
         </p:txBody>
       </p:sp>
@@ -37183,7 +35106,7 @@
           <a:lstStyle/>
           <a:p>
             <a:r>
-              <a:rPr lang="en-US" smtClean="0"/>
+              <a:rPr lang="en-US" dirty="0" smtClean="0"/>
               <a:t>3/19/2016</a:t>
             </a:r>
             <a:endParaRPr lang="en-US" dirty="0"/>
@@ -37206,7 +35129,7 @@
           <a:lstStyle/>
           <a:p>
             <a:r>
-              <a:rPr lang="en-US" smtClean="0"/>
+              <a:rPr lang="en-US" dirty="0" smtClean="0"/>
               <a:t>SharePoint Saturday Chicago Suburbs - Spice up Your Forms and Views: Deep Dive into Client Side Rendering</a:t>
             </a:r>
             <a:endParaRPr lang="en-US" dirty="0"/>
@@ -37334,7 +35257,7 @@
           <a:lstStyle/>
           <a:p>
             <a:r>
-              <a:rPr lang="en-US" smtClean="0"/>
+              <a:rPr lang="en-US" dirty="0" smtClean="0"/>
               <a:t>3/19/2016</a:t>
             </a:r>
             <a:endParaRPr lang="en-US" dirty="0"/>
@@ -37357,7 +35280,7 @@
           <a:lstStyle/>
           <a:p>
             <a:r>
-              <a:rPr lang="en-US" smtClean="0"/>
+              <a:rPr lang="en-US" dirty="0" smtClean="0"/>
               <a:t>SharePoint Saturday Chicago Suburbs - Spice up Your Forms and Views: Deep Dive into Client Side Rendering</a:t>
             </a:r>
             <a:endParaRPr lang="en-US" dirty="0"/>
@@ -37479,7 +35402,7 @@
           <a:lstStyle/>
           <a:p>
             <a:r>
-              <a:rPr lang="en-US" smtClean="0"/>
+              <a:rPr lang="en-US" dirty="0" smtClean="0"/>
               <a:t>3/19/2016</a:t>
             </a:r>
             <a:endParaRPr lang="en-US" dirty="0"/>
@@ -37502,7 +35425,7 @@
           <a:lstStyle/>
           <a:p>
             <a:r>
-              <a:rPr lang="en-US" smtClean="0"/>
+              <a:rPr lang="en-US" dirty="0" smtClean="0"/>
               <a:t>SharePoint Saturday Chicago Suburbs - Spice up Your Forms and Views: Deep Dive into Client Side Rendering</a:t>
             </a:r>
             <a:endParaRPr lang="en-US" dirty="0"/>
@@ -37609,7 +35532,7 @@
           <a:lstStyle/>
           <a:p>
             <a:r>
-              <a:rPr lang="en-US" smtClean="0"/>
+              <a:rPr lang="en-US" dirty="0" smtClean="0"/>
               <a:t>3/19/2016</a:t>
             </a:r>
             <a:endParaRPr lang="en-US" dirty="0"/>
@@ -37632,7 +35555,7 @@
           <a:lstStyle/>
           <a:p>
             <a:r>
-              <a:rPr lang="en-US" smtClean="0"/>
+              <a:rPr lang="en-US" dirty="0" smtClean="0"/>
               <a:t>SharePoint Saturday Chicago Suburbs - Spice up Your Forms and Views: Deep Dive into Client Side Rendering</a:t>
             </a:r>
             <a:endParaRPr lang="en-US" dirty="0"/>
@@ -37745,7 +35668,7 @@
           <a:lstStyle/>
           <a:p>
             <a:r>
-              <a:rPr lang="en-US" smtClean="0"/>
+              <a:rPr lang="en-US" dirty="0" smtClean="0"/>
               <a:t>3/19/2016</a:t>
             </a:r>
             <a:endParaRPr lang="en-US" dirty="0"/>
@@ -37768,7 +35691,7 @@
           <a:lstStyle/>
           <a:p>
             <a:r>
-              <a:rPr lang="en-US" smtClean="0"/>
+              <a:rPr lang="en-US" dirty="0" smtClean="0"/>
               <a:t>SharePoint Saturday Chicago Suburbs - Spice up Your Forms and Views: Deep Dive into Client Side Rendering</a:t>
             </a:r>
             <a:endParaRPr lang="en-US" dirty="0"/>
@@ -37880,7 +35803,7 @@
           <a:lstStyle/>
           <a:p>
             <a:r>
-              <a:rPr lang="en-US" smtClean="0"/>
+              <a:rPr lang="en-US" dirty="0" smtClean="0"/>
               <a:t>3/19/2016</a:t>
             </a:r>
             <a:endParaRPr lang="en-US" dirty="0"/>
@@ -37903,7 +35826,7 @@
           <a:lstStyle/>
           <a:p>
             <a:r>
-              <a:rPr lang="en-US" smtClean="0"/>
+              <a:rPr lang="en-US" dirty="0" smtClean="0"/>
               <a:t>SharePoint Saturday Chicago Suburbs - Spice up Your Forms and Views: Deep Dive into Client Side Rendering</a:t>
             </a:r>
             <a:endParaRPr lang="en-US" dirty="0"/>
@@ -38015,7 +35938,7 @@
           <a:lstStyle/>
           <a:p>
             <a:r>
-              <a:rPr lang="en-US" smtClean="0"/>
+              <a:rPr lang="en-US" dirty="0" smtClean="0"/>
               <a:t>3/19/2016</a:t>
             </a:r>
             <a:endParaRPr lang="en-US" dirty="0"/>
@@ -38038,7 +35961,7 @@
           <a:lstStyle/>
           <a:p>
             <a:r>
-              <a:rPr lang="en-US" smtClean="0"/>
+              <a:rPr lang="en-US" dirty="0" smtClean="0"/>
               <a:t>SharePoint Saturday Chicago Suburbs - Spice up Your Forms and Views: Deep Dive into Client Side Rendering</a:t>
             </a:r>
             <a:endParaRPr lang="en-US" dirty="0"/>
@@ -38153,7 +36076,7 @@
           <a:lstStyle/>
           <a:p>
             <a:r>
-              <a:rPr lang="en-US" smtClean="0"/>
+              <a:rPr lang="en-US" dirty="0" smtClean="0"/>
               <a:t>3/19/2016</a:t>
             </a:r>
             <a:endParaRPr lang="en-US" dirty="0"/>
@@ -38176,7 +36099,7 @@
           <a:lstStyle/>
           <a:p>
             <a:r>
-              <a:rPr lang="en-US" smtClean="0"/>
+              <a:rPr lang="en-US" dirty="0" smtClean="0"/>
               <a:t>SharePoint Saturday Chicago Suburbs - Spice up Your Forms and Views: Deep Dive into Client Side Rendering</a:t>
             </a:r>
             <a:endParaRPr lang="en-US" dirty="0"/>
@@ -38290,7 +36213,7 @@
           <a:lstStyle/>
           <a:p>
             <a:r>
-              <a:rPr lang="en-US" smtClean="0"/>
+              <a:rPr lang="en-US" dirty="0" smtClean="0"/>
               <a:t>3/19/2016</a:t>
             </a:r>
             <a:endParaRPr lang="en-US" dirty="0"/>
@@ -38313,7 +36236,7 @@
           <a:lstStyle/>
           <a:p>
             <a:r>
-              <a:rPr lang="en-US" smtClean="0"/>
+              <a:rPr lang="en-US" dirty="0" smtClean="0"/>
               <a:t>SharePoint Saturday Chicago Suburbs - Spice up Your Forms and Views: Deep Dive into Client Side Rendering</a:t>
             </a:r>
             <a:endParaRPr lang="en-US" dirty="0"/>
@@ -38421,7 +36344,7 @@
           <a:lstStyle/>
           <a:p>
             <a:r>
-              <a:rPr lang="en-US" smtClean="0"/>
+              <a:rPr lang="en-US" dirty="0" smtClean="0"/>
               <a:t>3/19/2016</a:t>
             </a:r>
             <a:endParaRPr lang="en-US" dirty="0"/>
@@ -38444,7 +36367,7 @@
           <a:lstStyle/>
           <a:p>
             <a:r>
-              <a:rPr lang="en-US" smtClean="0"/>
+              <a:rPr lang="en-US" dirty="0" smtClean="0"/>
               <a:t>SharePoint Saturday Chicago Suburbs - Spice up Your Forms and Views: Deep Dive into Client Side Rendering</a:t>
             </a:r>
             <a:endParaRPr lang="en-US" dirty="0"/>
@@ -38675,7 +36598,7 @@
           <a:lstStyle/>
           <a:p>
             <a:r>
-              <a:rPr lang="en-US" smtClean="0"/>
+              <a:rPr lang="en-US" dirty="0" smtClean="0"/>
               <a:t>SharePoint Saturday Chicago Suburbs - Spice up Your Forms and Views: Deep Dive into Client Side Rendering</a:t>
             </a:r>
             <a:endParaRPr lang="en-US" dirty="0"/>
@@ -38698,7 +36621,7 @@
           <a:lstStyle/>
           <a:p>
             <a:r>
-              <a:rPr lang="en-US" smtClean="0"/>
+              <a:rPr lang="en-US" dirty="0" smtClean="0"/>
               <a:t>3/19/2016</a:t>
             </a:r>
             <a:endParaRPr lang="en-US" dirty="0"/>
@@ -40436,7 +38359,7 @@
           <a:lstStyle/>
           <a:p>
             <a:r>
-              <a:rPr lang="en-US" smtClean="0"/>
+              <a:rPr lang="en-US" dirty="0" smtClean="0"/>
               <a:t>SharePoint Saturday Chicago Suburbs - Spice up Your Forms and Views: Deep Dive into Client Side Rendering</a:t>
             </a:r>
             <a:endParaRPr lang="en-US" dirty="0"/>
@@ -40459,7 +38382,7 @@
           <a:lstStyle/>
           <a:p>
             <a:r>
-              <a:rPr lang="en-US" smtClean="0"/>
+              <a:rPr lang="en-US" dirty="0" smtClean="0"/>
               <a:t>3/19/2016</a:t>
             </a:r>
             <a:endParaRPr lang="en-US" dirty="0"/>
@@ -40610,7 +38533,7 @@
           <a:lstStyle/>
           <a:p>
             <a:r>
-              <a:rPr lang="en-US" smtClean="0"/>
+              <a:rPr lang="en-US" dirty="0" smtClean="0"/>
               <a:t>3/19/2016</a:t>
             </a:r>
             <a:endParaRPr lang="en-US" dirty="0"/>
@@ -40633,7 +38556,7 @@
           <a:lstStyle/>
           <a:p>
             <a:r>
-              <a:rPr lang="en-US" smtClean="0"/>
+              <a:rPr lang="en-US" dirty="0" smtClean="0"/>
               <a:t>SharePoint Saturday Chicago Suburbs - Spice up Your Forms and Views: Deep Dive into Client Side Rendering</a:t>
             </a:r>
             <a:endParaRPr lang="en-US" dirty="0"/>
@@ -40714,7 +38637,7 @@
             <p:ph idx="1"/>
             <p:extLst>
               <p:ext uri="{D42A27DB-BD31-4B8C-83A1-F6EECF244321}">
-                <p14:modId xmlns:p14="http://schemas.microsoft.com/office/powerpoint/2010/main" val="3925705589"/>
+                <p14:modId xmlns:p14="http://schemas.microsoft.com/office/powerpoint/2010/main" val="4280250526"/>
               </p:ext>
             </p:extLst>
           </p:nvPr>
@@ -40745,7 +38668,7 @@
           <a:lstStyle/>
           <a:p>
             <a:r>
-              <a:rPr lang="en-US" smtClean="0"/>
+              <a:rPr lang="en-US" dirty="0" smtClean="0"/>
               <a:t>3/19/2016</a:t>
             </a:r>
             <a:endParaRPr lang="en-US" dirty="0"/>
@@ -40768,7 +38691,7 @@
           <a:lstStyle/>
           <a:p>
             <a:r>
-              <a:rPr lang="en-US" smtClean="0"/>
+              <a:rPr lang="en-US" dirty="0" smtClean="0"/>
               <a:t>SharePoint Saturday Chicago Suburbs - Spice up Your Forms and Views: Deep Dive into Client Side Rendering</a:t>
             </a:r>
             <a:endParaRPr lang="en-US" dirty="0"/>
@@ -40876,7 +38799,7 @@
           <a:lstStyle/>
           <a:p>
             <a:r>
-              <a:rPr lang="en-US" smtClean="0"/>
+              <a:rPr lang="en-US" dirty="0" smtClean="0"/>
               <a:t>3/19/2016</a:t>
             </a:r>
             <a:endParaRPr lang="en-US" dirty="0"/>
@@ -40899,7 +38822,7 @@
           <a:lstStyle/>
           <a:p>
             <a:r>
-              <a:rPr lang="en-US" smtClean="0"/>
+              <a:rPr lang="en-US" dirty="0" smtClean="0"/>
               <a:t>SharePoint Saturday Chicago Suburbs - Spice up Your Forms and Views: Deep Dive into Client Side Rendering</a:t>
             </a:r>
             <a:endParaRPr lang="en-US" dirty="0"/>
@@ -40981,7 +38904,7 @@
           <a:lstStyle/>
           <a:p>
             <a:r>
-              <a:rPr lang="en-US" smtClean="0"/>
+              <a:rPr lang="en-US" dirty="0" smtClean="0"/>
               <a:t>3/19/2016</a:t>
             </a:r>
             <a:endParaRPr lang="en-US" dirty="0"/>
@@ -41004,7 +38927,7 @@
           <a:lstStyle/>
           <a:p>
             <a:r>
-              <a:rPr lang="en-US" smtClean="0"/>
+              <a:rPr lang="en-US" dirty="0" smtClean="0"/>
               <a:t>SharePoint Saturday Chicago Suburbs - Spice up Your Forms and Views: Deep Dive into Client Side Rendering</a:t>
             </a:r>
             <a:endParaRPr lang="en-US" dirty="0"/>
@@ -41137,7 +39060,7 @@
           <a:lstStyle/>
           <a:p>
             <a:r>
-              <a:rPr lang="en-US" smtClean="0"/>
+              <a:rPr lang="en-US" dirty="0" smtClean="0"/>
               <a:t>3/19/2016</a:t>
             </a:r>
             <a:endParaRPr lang="en-US" dirty="0"/>
@@ -41160,7 +39083,7 @@
           <a:lstStyle/>
           <a:p>
             <a:r>
-              <a:rPr lang="en-US" smtClean="0"/>
+              <a:rPr lang="en-US" dirty="0" smtClean="0"/>
               <a:t>SharePoint Saturday Chicago Suburbs - Spice up Your Forms and Views: Deep Dive into Client Side Rendering</a:t>
             </a:r>
             <a:endParaRPr lang="en-US" dirty="0"/>
@@ -41237,7 +39160,7 @@
             <p:ph idx="1"/>
             <p:extLst>
               <p:ext uri="{D42A27DB-BD31-4B8C-83A1-F6EECF244321}">
-                <p14:modId xmlns:p14="http://schemas.microsoft.com/office/powerpoint/2010/main" val="3286164470"/>
+                <p14:modId xmlns:p14="http://schemas.microsoft.com/office/powerpoint/2010/main" val="4054236663"/>
               </p:ext>
             </p:extLst>
           </p:nvPr>
@@ -41268,7 +39191,7 @@
           <a:lstStyle/>
           <a:p>
             <a:r>
-              <a:rPr lang="en-US" smtClean="0"/>
+              <a:rPr lang="en-US" dirty="0" smtClean="0"/>
               <a:t>3/19/2016</a:t>
             </a:r>
             <a:endParaRPr lang="en-US" dirty="0"/>
@@ -41291,7 +39214,7 @@
           <a:lstStyle/>
           <a:p>
             <a:r>
-              <a:rPr lang="en-US" smtClean="0"/>
+              <a:rPr lang="en-US" dirty="0" smtClean="0"/>
               <a:t>SharePoint Saturday Chicago Suburbs - Spice up Your Forms and Views: Deep Dive into Client Side Rendering</a:t>
             </a:r>
             <a:endParaRPr lang="en-US" dirty="0"/>

</xml_diff>